<commit_message>
Move files, change colors in templates, fix styling issue
</commit_message>
<xml_diff>
--- a/Wissenschaftskommunikations Artikel/sliding-window/sliding_window_cutting_template.pptx
+++ b/Wissenschaftskommunikations Artikel/sliding-window/sliding_window_cutting_template.pptx
@@ -5,21 +5,22 @@
     <p:sldMasterId id="2147483659" r:id="rId1"/>
   </p:sldMasterIdLst>
   <p:notesMasterIdLst>
-    <p:notesMasterId r:id="rId4"/>
+    <p:notesMasterId r:id="rId5"/>
   </p:notesMasterIdLst>
   <p:sldIdLst>
     <p:sldId id="256" r:id="rId2"/>
-    <p:sldId id="257" r:id="rId3"/>
+    <p:sldId id="258" r:id="rId3"/>
+    <p:sldId id="257" r:id="rId4"/>
   </p:sldIdLst>
   <p:sldSz cx="7559675" cy="10691813"/>
   <p:notesSz cx="6797675" cy="9926638"/>
   <p:embeddedFontLst>
     <p:embeddedFont>
       <p:font typeface="Roboto" panose="02000000000000000000" pitchFamily="2" charset="0"/>
-      <p:regular r:id="rId5"/>
-      <p:bold r:id="rId6"/>
-      <p:italic r:id="rId7"/>
-      <p:boldItalic r:id="rId8"/>
+      <p:regular r:id="rId6"/>
+      <p:bold r:id="rId7"/>
+      <p:italic r:id="rId8"/>
+      <p:boldItalic r:id="rId9"/>
     </p:embeddedFont>
   </p:embeddedFontLst>
   <p:defaultTextStyle>
@@ -816,6 +817,115 @@
 </file>
 
 <file path=ppt/notesSlides/notesSlide2.xml><?xml version="1.0" encoding="utf-8"?>
+<p:notes xmlns:a="http://schemas.openxmlformats.org/drawingml/2006/main" xmlns:r="http://schemas.openxmlformats.org/officeDocument/2006/relationships" xmlns:p="http://schemas.openxmlformats.org/presentationml/2006/main" showMasterSp="0" showMasterPhAnim="0">
+  <p:cSld>
+    <p:spTree>
+      <p:nvGrpSpPr>
+        <p:cNvPr id="1" name="Shape 61"/>
+        <p:cNvGrpSpPr/>
+        <p:nvPr/>
+      </p:nvGrpSpPr>
+      <p:grpSpPr>
+        <a:xfrm>
+          <a:off x="0" y="0"/>
+          <a:ext cx="0" cy="0"/>
+          <a:chOff x="0" y="0"/>
+          <a:chExt cx="0" cy="0"/>
+        </a:xfrm>
+      </p:grpSpPr>
+      <p:sp>
+        <p:nvSpPr>
+          <p:cNvPr id="62" name="Google Shape;62;g2dc4eb6888f_1_5:notes"/>
+          <p:cNvSpPr>
+            <a:spLocks noGrp="1" noRot="1" noChangeAspect="1"/>
+          </p:cNvSpPr>
+          <p:nvPr>
+            <p:ph type="sldImg" idx="2"/>
+          </p:nvPr>
+        </p:nvSpPr>
+        <p:spPr>
+          <a:xfrm>
+            <a:off x="2082800" y="744538"/>
+            <a:ext cx="2632075" cy="3722687"/>
+          </a:xfrm>
+          <a:custGeom>
+            <a:avLst/>
+            <a:gdLst/>
+            <a:ahLst/>
+            <a:cxnLst/>
+            <a:rect l="l" t="t" r="r" b="b"/>
+            <a:pathLst>
+              <a:path w="120000" h="120000" extrusionOk="0">
+                <a:moveTo>
+                  <a:pt x="0" y="0"/>
+                </a:moveTo>
+                <a:lnTo>
+                  <a:pt x="120000" y="0"/>
+                </a:lnTo>
+                <a:lnTo>
+                  <a:pt x="120000" y="120000"/>
+                </a:lnTo>
+                <a:lnTo>
+                  <a:pt x="0" y="120000"/>
+                </a:lnTo>
+                <a:close/>
+              </a:path>
+            </a:pathLst>
+          </a:custGeom>
+        </p:spPr>
+      </p:sp>
+      <p:sp>
+        <p:nvSpPr>
+          <p:cNvPr id="63" name="Google Shape;63;g2dc4eb6888f_1_5:notes"/>
+          <p:cNvSpPr txBox="1">
+            <a:spLocks noGrp="1"/>
+          </p:cNvSpPr>
+          <p:nvPr>
+            <p:ph type="body" idx="1"/>
+          </p:nvPr>
+        </p:nvSpPr>
+        <p:spPr>
+          <a:xfrm>
+            <a:off x="679768" y="4715153"/>
+            <a:ext cx="5438140" cy="4466987"/>
+          </a:xfrm>
+          <a:prstGeom prst="rect">
+            <a:avLst/>
+          </a:prstGeom>
+        </p:spPr>
+        <p:txBody>
+          <a:bodyPr spcFirstLastPara="1" wrap="square" lIns="91425" tIns="91425" rIns="91425" bIns="91425" anchor="t" anchorCtr="0">
+            <a:noAutofit/>
+          </a:bodyPr>
+          <a:lstStyle/>
+          <a:p>
+            <a:pPr marL="0" lvl="0" indent="0" algn="l" rtl="0">
+              <a:spcBef>
+                <a:spcPts val="0"/>
+              </a:spcBef>
+              <a:spcAft>
+                <a:spcPts val="0"/>
+              </a:spcAft>
+              <a:buNone/>
+            </a:pPr>
+            <a:endParaRPr/>
+          </a:p>
+        </p:txBody>
+      </p:sp>
+    </p:spTree>
+    <p:extLst>
+      <p:ext uri="{BB962C8B-B14F-4D97-AF65-F5344CB8AC3E}">
+        <p14:creationId xmlns:p14="http://schemas.microsoft.com/office/powerpoint/2010/main" val="908754587"/>
+      </p:ext>
+    </p:extLst>
+  </p:cSld>
+  <p:clrMapOvr>
+    <a:masterClrMapping/>
+  </p:clrMapOvr>
+</p:notes>
+</file>
+
+<file path=ppt/notesSlides/notesSlide3.xml><?xml version="1.0" encoding="utf-8"?>
 <p:notes xmlns:a="http://schemas.openxmlformats.org/drawingml/2006/main" xmlns:r="http://schemas.openxmlformats.org/officeDocument/2006/relationships" xmlns:p="http://schemas.openxmlformats.org/presentationml/2006/main" showMasterSp="0" showMasterPhAnim="0">
   <p:cSld>
     <p:spTree>
@@ -5625,62 +5735,6 @@
           </a:p>
         </p:txBody>
       </p:sp>
-      <p:cxnSp>
-        <p:nvCxnSpPr>
-          <p:cNvPr id="59" name="Google Shape;59;p13"/>
-          <p:cNvCxnSpPr>
-            <a:cxnSpLocks/>
-          </p:cNvCxnSpPr>
-          <p:nvPr/>
-        </p:nvCxnSpPr>
-        <p:spPr>
-          <a:xfrm rot="10800000">
-            <a:off x="-3" y="4269125"/>
-            <a:ext cx="7559675" cy="0"/>
-          </a:xfrm>
-          <a:prstGeom prst="straightConnector1">
-            <a:avLst/>
-          </a:prstGeom>
-          <a:noFill/>
-          <a:ln w="12700" cap="flat" cmpd="sng">
-            <a:solidFill>
-              <a:schemeClr val="lt2"/>
-            </a:solidFill>
-            <a:prstDash val="solid"/>
-            <a:round/>
-            <a:headEnd type="none" w="med" len="med"/>
-            <a:tailEnd type="none" w="med" len="med"/>
-          </a:ln>
-        </p:spPr>
-      </p:cxnSp>
-      <p:cxnSp>
-        <p:nvCxnSpPr>
-          <p:cNvPr id="60" name="Google Shape;60;p13"/>
-          <p:cNvCxnSpPr>
-            <a:cxnSpLocks/>
-          </p:cNvCxnSpPr>
-          <p:nvPr/>
-        </p:nvCxnSpPr>
-        <p:spPr>
-          <a:xfrm rot="10800000">
-            <a:off x="-4" y="8780780"/>
-            <a:ext cx="7559675" cy="0"/>
-          </a:xfrm>
-          <a:prstGeom prst="straightConnector1">
-            <a:avLst/>
-          </a:prstGeom>
-          <a:noFill/>
-          <a:ln w="12700" cap="flat" cmpd="sng">
-            <a:solidFill>
-              <a:schemeClr val="lt2"/>
-            </a:solidFill>
-            <a:prstDash val="solid"/>
-            <a:round/>
-            <a:headEnd type="none" w="med" len="med"/>
-            <a:tailEnd type="none" w="med" len="med"/>
-          </a:ln>
-        </p:spPr>
-      </p:cxnSp>
       <p:sp>
         <p:nvSpPr>
           <p:cNvPr id="9" name="Google Shape;58;p13">
@@ -5851,10 +5905,10 @@
       </p:sp>
       <p:cxnSp>
         <p:nvCxnSpPr>
-          <p:cNvPr id="13" name="Google Shape;59;p13">
+          <p:cNvPr id="2" name="Google Shape;59;p13">
             <a:extLst>
               <a:ext uri="{FF2B5EF4-FFF2-40B4-BE49-F238E27FC236}">
-                <a16:creationId xmlns:a16="http://schemas.microsoft.com/office/drawing/2014/main" id="{4B40226A-D09D-A49E-D042-D935E19C44C7}"/>
+                <a16:creationId xmlns:a16="http://schemas.microsoft.com/office/drawing/2014/main" id="{33EAFC59-0394-A543-DF95-135CEFAEDDA2}"/>
               </a:ext>
             </a:extLst>
           </p:cNvPr>
@@ -5864,9 +5918,9 @@
           <p:nvPr/>
         </p:nvCxnSpPr>
         <p:spPr>
-          <a:xfrm>
-            <a:off x="6840000" y="3911850"/>
-            <a:ext cx="0" cy="5223664"/>
+          <a:xfrm rot="10800000">
+            <a:off x="-3" y="3769253"/>
+            <a:ext cx="7559675" cy="0"/>
           </a:xfrm>
           <a:prstGeom prst="straightConnector1">
             <a:avLst/>
@@ -5885,10 +5939,10 @@
       </p:cxnSp>
       <p:cxnSp>
         <p:nvCxnSpPr>
-          <p:cNvPr id="16" name="Google Shape;59;p13">
+          <p:cNvPr id="3" name="Google Shape;60;p13">
             <a:extLst>
               <a:ext uri="{FF2B5EF4-FFF2-40B4-BE49-F238E27FC236}">
-                <a16:creationId xmlns:a16="http://schemas.microsoft.com/office/drawing/2014/main" id="{3FBC1A25-B752-E4FB-1675-F086727095F6}"/>
+                <a16:creationId xmlns:a16="http://schemas.microsoft.com/office/drawing/2014/main" id="{AC3233C6-2C18-C95C-224B-13BC79D13837}"/>
               </a:ext>
             </a:extLst>
           </p:cNvPr>
@@ -5898,9 +5952,9 @@
           <p:nvPr/>
         </p:nvCxnSpPr>
         <p:spPr>
-          <a:xfrm>
-            <a:off x="720000" y="3911850"/>
-            <a:ext cx="0" cy="5223664"/>
+          <a:xfrm rot="10800000">
+            <a:off x="-4" y="8780780"/>
+            <a:ext cx="7559675" cy="0"/>
           </a:xfrm>
           <a:prstGeom prst="straightConnector1">
             <a:avLst/>
@@ -5917,6 +5971,113 @@
           </a:ln>
         </p:spPr>
       </p:cxnSp>
+      <p:cxnSp>
+        <p:nvCxnSpPr>
+          <p:cNvPr id="4" name="Google Shape;59;p13">
+            <a:extLst>
+              <a:ext uri="{FF2B5EF4-FFF2-40B4-BE49-F238E27FC236}">
+                <a16:creationId xmlns:a16="http://schemas.microsoft.com/office/drawing/2014/main" id="{7FAE15A3-DFDA-6437-6766-6AC71B2C8CBF}"/>
+              </a:ext>
+            </a:extLst>
+          </p:cNvPr>
+          <p:cNvCxnSpPr>
+            <a:cxnSpLocks/>
+          </p:cNvCxnSpPr>
+          <p:nvPr/>
+        </p:nvCxnSpPr>
+        <p:spPr>
+          <a:xfrm>
+            <a:off x="6840000" y="3401568"/>
+            <a:ext cx="0" cy="5733946"/>
+          </a:xfrm>
+          <a:prstGeom prst="straightConnector1">
+            <a:avLst/>
+          </a:prstGeom>
+          <a:noFill/>
+          <a:ln w="12700" cap="flat" cmpd="sng">
+            <a:solidFill>
+              <a:schemeClr val="lt2"/>
+            </a:solidFill>
+            <a:prstDash val="solid"/>
+            <a:round/>
+            <a:headEnd type="none" w="med" len="med"/>
+            <a:tailEnd type="none" w="med" len="med"/>
+          </a:ln>
+        </p:spPr>
+      </p:cxnSp>
+      <p:cxnSp>
+        <p:nvCxnSpPr>
+          <p:cNvPr id="5" name="Google Shape;59;p13">
+            <a:extLst>
+              <a:ext uri="{FF2B5EF4-FFF2-40B4-BE49-F238E27FC236}">
+                <a16:creationId xmlns:a16="http://schemas.microsoft.com/office/drawing/2014/main" id="{144A339A-71E5-1293-20B3-508169D2133C}"/>
+              </a:ext>
+            </a:extLst>
+          </p:cNvPr>
+          <p:cNvCxnSpPr>
+            <a:cxnSpLocks/>
+          </p:cNvCxnSpPr>
+          <p:nvPr/>
+        </p:nvCxnSpPr>
+        <p:spPr>
+          <a:xfrm>
+            <a:off x="720000" y="3401568"/>
+            <a:ext cx="0" cy="5733946"/>
+          </a:xfrm>
+          <a:prstGeom prst="straightConnector1">
+            <a:avLst/>
+          </a:prstGeom>
+          <a:noFill/>
+          <a:ln w="12700" cap="flat" cmpd="sng">
+            <a:solidFill>
+              <a:schemeClr val="lt2"/>
+            </a:solidFill>
+            <a:prstDash val="solid"/>
+            <a:round/>
+            <a:headEnd type="none" w="med" len="med"/>
+            <a:tailEnd type="none" w="med" len="med"/>
+          </a:ln>
+        </p:spPr>
+      </p:cxnSp>
+      <p:sp>
+        <p:nvSpPr>
+          <p:cNvPr id="15" name="Textfeld 14">
+            <a:extLst>
+              <a:ext uri="{FF2B5EF4-FFF2-40B4-BE49-F238E27FC236}">
+                <a16:creationId xmlns:a16="http://schemas.microsoft.com/office/drawing/2014/main" id="{7B7CE0BC-EBB7-B37C-9CF0-354FA81A15ED}"/>
+              </a:ext>
+            </a:extLst>
+          </p:cNvPr>
+          <p:cNvSpPr txBox="1"/>
+          <p:nvPr/>
+        </p:nvSpPr>
+        <p:spPr>
+          <a:xfrm>
+            <a:off x="1404824" y="1623786"/>
+            <a:ext cx="4750018" cy="307777"/>
+          </a:xfrm>
+          <a:prstGeom prst="rect">
+            <a:avLst/>
+          </a:prstGeom>
+          <a:noFill/>
+        </p:spPr>
+        <p:txBody>
+          <a:bodyPr wrap="none" rtlCol="0">
+            <a:spAutoFit/>
+          </a:bodyPr>
+          <a:lstStyle/>
+          <a:p>
+            <a:r>
+              <a:rPr lang="de-DE" dirty="0">
+                <a:solidFill>
+                  <a:srgbClr val="FF0000"/>
+                </a:solidFill>
+              </a:rPr>
+              <a:t>Nur geeignet für beidseitigen Druck an der längeren Seite</a:t>
+            </a:r>
+          </a:p>
+        </p:txBody>
+      </p:sp>
     </p:spTree>
   </p:cSld>
   <p:clrMapOvr>
@@ -5963,7 +6124,7 @@
             <a:avLst/>
           </a:prstGeom>
           <a:solidFill>
-            <a:srgbClr val="333333"/>
+            <a:schemeClr val="tx1"/>
           </a:solidFill>
           <a:ln>
             <a:noFill/>
@@ -6001,7 +6162,7 @@
             <a:avLst/>
           </a:prstGeom>
           <a:solidFill>
-            <a:srgbClr val="333333"/>
+            <a:schemeClr val="tx1"/>
           </a:solidFill>
           <a:ln>
             <a:noFill/>
@@ -6077,7 +6238,7 @@
             <a:avLst/>
           </a:prstGeom>
           <a:solidFill>
-            <a:srgbClr val="333333"/>
+            <a:schemeClr val="tx1"/>
           </a:solidFill>
           <a:ln>
             <a:noFill/>
@@ -6109,7 +6270,7 @@
             <a:avLst/>
           </a:prstGeom>
           <a:solidFill>
-            <a:srgbClr val="333333"/>
+            <a:schemeClr val="tx1"/>
           </a:solidFill>
           <a:ln>
             <a:noFill/>
@@ -6162,8 +6323,8 @@
         </p:nvSpPr>
         <p:spPr>
           <a:xfrm>
-            <a:off x="882597" y="4642935"/>
-            <a:ext cx="1052883" cy="388250"/>
+            <a:off x="843872" y="4647641"/>
+            <a:ext cx="1052883" cy="368528"/>
           </a:xfrm>
           <a:prstGeom prst="rect">
             <a:avLst/>
@@ -6179,8 +6340,9 @@
           </a:bodyPr>
           <a:lstStyle/>
           <a:p>
+            <a:pPr algn="r"/>
             <a:r>
-              <a:rPr lang="de" sz="1492" b="1" dirty="0">
+              <a:rPr lang="de" b="1" dirty="0">
                 <a:solidFill>
                   <a:schemeClr val="dk2"/>
                 </a:solidFill>
@@ -6191,7 +6353,7 @@
               </a:rPr>
               <a:t>Eingabe 1</a:t>
             </a:r>
-            <a:endParaRPr sz="1492" b="1" dirty="0">
+            <a:endParaRPr b="1" dirty="0">
               <a:solidFill>
                 <a:schemeClr val="dk2"/>
               </a:solidFill>
@@ -6239,8 +6401,8 @@
         </p:nvSpPr>
         <p:spPr>
           <a:xfrm>
-            <a:off x="882597" y="5482787"/>
-            <a:ext cx="1052883" cy="388250"/>
+            <a:off x="843871" y="5488561"/>
+            <a:ext cx="1052883" cy="368528"/>
           </a:xfrm>
           <a:prstGeom prst="rect">
             <a:avLst/>
@@ -6256,8 +6418,9 @@
           </a:bodyPr>
           <a:lstStyle/>
           <a:p>
+            <a:pPr algn="r"/>
             <a:r>
-              <a:rPr lang="de" sz="1492" b="1" dirty="0">
+              <a:rPr lang="de" b="1" dirty="0">
                 <a:solidFill>
                   <a:schemeClr val="dk2"/>
                 </a:solidFill>
@@ -6268,7 +6431,7 @@
               </a:rPr>
               <a:t>Eingabe 2</a:t>
             </a:r>
-            <a:endParaRPr sz="1492" b="1" dirty="0">
+            <a:endParaRPr b="1" dirty="0">
               <a:solidFill>
                 <a:schemeClr val="dk2"/>
               </a:solidFill>
@@ -6316,8 +6479,8 @@
         </p:nvSpPr>
         <p:spPr>
           <a:xfrm>
-            <a:off x="882596" y="7173953"/>
-            <a:ext cx="1052883" cy="388250"/>
+            <a:off x="843870" y="7164179"/>
+            <a:ext cx="1052883" cy="368528"/>
           </a:xfrm>
           <a:prstGeom prst="rect">
             <a:avLst/>
@@ -6333,8 +6496,9 @@
           </a:bodyPr>
           <a:lstStyle/>
           <a:p>
+            <a:pPr algn="r"/>
             <a:r>
-              <a:rPr lang="de" sz="1492" b="1" dirty="0">
+              <a:rPr lang="de" b="1" dirty="0">
                 <a:solidFill>
                   <a:schemeClr val="dk2"/>
                 </a:solidFill>
@@ -6345,7 +6509,7 @@
               </a:rPr>
               <a:t>Eingabe 3</a:t>
             </a:r>
-            <a:endParaRPr sz="1492" b="1" dirty="0">
+            <a:endParaRPr b="1" dirty="0">
               <a:solidFill>
                 <a:schemeClr val="dk2"/>
               </a:solidFill>
@@ -6393,8 +6557,8 @@
         </p:nvSpPr>
         <p:spPr>
           <a:xfrm>
-            <a:off x="882595" y="8018425"/>
-            <a:ext cx="1052883" cy="388250"/>
+            <a:off x="843870" y="8020841"/>
+            <a:ext cx="1052883" cy="368528"/>
           </a:xfrm>
           <a:prstGeom prst="rect">
             <a:avLst/>
@@ -6410,8 +6574,9 @@
           </a:bodyPr>
           <a:lstStyle/>
           <a:p>
+            <a:pPr algn="r"/>
             <a:r>
-              <a:rPr lang="de" sz="1492" b="1" dirty="0">
+              <a:rPr lang="de" b="1" dirty="0">
                 <a:solidFill>
                   <a:schemeClr val="dk2"/>
                 </a:solidFill>
@@ -6422,7 +6587,7 @@
               </a:rPr>
               <a:t>Eingabe 4</a:t>
             </a:r>
-            <a:endParaRPr sz="1492" b="1" dirty="0">
+            <a:endParaRPr b="1" dirty="0">
               <a:solidFill>
                 <a:schemeClr val="dk2"/>
               </a:solidFill>
@@ -6442,8 +6607,8 @@
         </p:nvSpPr>
         <p:spPr>
           <a:xfrm>
-            <a:off x="5499513" y="6327998"/>
-            <a:ext cx="1052883" cy="388250"/>
+            <a:off x="5590953" y="6337859"/>
+            <a:ext cx="1052883" cy="368528"/>
           </a:xfrm>
           <a:prstGeom prst="rect">
             <a:avLst/>
@@ -6459,11 +6624,10 @@
           </a:bodyPr>
           <a:lstStyle/>
           <a:p>
-            <a:pPr algn="r"/>
             <a:r>
-              <a:rPr lang="de" sz="1492" b="1" dirty="0">
+              <a:rPr lang="de" b="1" dirty="0">
                 <a:solidFill>
-                  <a:schemeClr val="dk2"/>
+                  <a:srgbClr val="595959"/>
                 </a:solidFill>
                 <a:latin typeface="Roboto"/>
                 <a:ea typeface="Roboto"/>
@@ -6472,9 +6636,9 @@
               </a:rPr>
               <a:t>Ausgabe</a:t>
             </a:r>
-            <a:endParaRPr sz="1492" b="1" dirty="0">
+            <a:endParaRPr b="1" dirty="0">
               <a:solidFill>
-                <a:schemeClr val="dk2"/>
+                <a:srgbClr val="595959"/>
               </a:solidFill>
               <a:latin typeface="Roboto"/>
               <a:ea typeface="Roboto"/>
@@ -6509,6 +6673,409 @@
           <a:noFill/>
           <a:ln w="38100" cap="flat" cmpd="sng">
             <a:solidFill>
+              <a:srgbClr val="595959"/>
+            </a:solidFill>
+            <a:prstDash val="solid"/>
+            <a:round/>
+            <a:headEnd type="none" w="med" len="med"/>
+            <a:tailEnd type="triangle" w="med" len="med"/>
+          </a:ln>
+        </p:spPr>
+      </p:cxnSp>
+      <p:sp>
+        <p:nvSpPr>
+          <p:cNvPr id="2" name="Google Shape;72;p14">
+            <a:extLst>
+              <a:ext uri="{FF2B5EF4-FFF2-40B4-BE49-F238E27FC236}">
+                <a16:creationId xmlns:a16="http://schemas.microsoft.com/office/drawing/2014/main" id="{3498EBA5-0AF2-6D68-7E34-4B063DE8B055}"/>
+              </a:ext>
+            </a:extLst>
+          </p:cNvPr>
+          <p:cNvSpPr txBox="1"/>
+          <p:nvPr/>
+        </p:nvSpPr>
+        <p:spPr>
+          <a:xfrm>
+            <a:off x="2081153" y="3933691"/>
+            <a:ext cx="3336390" cy="399306"/>
+          </a:xfrm>
+          <a:prstGeom prst="rect">
+            <a:avLst/>
+          </a:prstGeom>
+          <a:noFill/>
+          <a:ln>
+            <a:noFill/>
+          </a:ln>
+        </p:spPr>
+        <p:txBody>
+          <a:bodyPr spcFirstLastPara="1" wrap="square" lIns="75802" tIns="75802" rIns="75802" bIns="75802" anchor="t" anchorCtr="0">
+            <a:spAutoFit/>
+          </a:bodyPr>
+          <a:lstStyle/>
+          <a:p>
+            <a:pPr algn="ctr"/>
+            <a:r>
+              <a:rPr lang="de" sz="1600" b="1" dirty="0">
+                <a:solidFill>
+                  <a:schemeClr val="accent4">
+                    <a:lumMod val="75000"/>
+                  </a:schemeClr>
+                </a:solidFill>
+                <a:latin typeface="Roboto"/>
+                <a:ea typeface="Roboto"/>
+                <a:cs typeface="Roboto"/>
+                <a:sym typeface="Roboto"/>
+              </a:rPr>
+              <a:t>Masked Language Modelling</a:t>
+            </a:r>
+            <a:endParaRPr sz="1600" b="1" dirty="0">
+              <a:solidFill>
+                <a:schemeClr val="accent4">
+                  <a:lumMod val="75000"/>
+                </a:schemeClr>
+              </a:solidFill>
+              <a:latin typeface="Roboto"/>
+              <a:ea typeface="Roboto"/>
+              <a:cs typeface="Roboto"/>
+              <a:sym typeface="Roboto"/>
+            </a:endParaRPr>
+          </a:p>
+        </p:txBody>
+      </p:sp>
+      <p:sp>
+        <p:nvSpPr>
+          <p:cNvPr id="3" name="Google Shape;74;p14">
+            <a:extLst>
+              <a:ext uri="{FF2B5EF4-FFF2-40B4-BE49-F238E27FC236}">
+                <a16:creationId xmlns:a16="http://schemas.microsoft.com/office/drawing/2014/main" id="{67F0E006-B3C6-F46A-0BD9-2AA18ED7F9BC}"/>
+              </a:ext>
+            </a:extLst>
+          </p:cNvPr>
+          <p:cNvSpPr txBox="1"/>
+          <p:nvPr/>
+        </p:nvSpPr>
+        <p:spPr>
+          <a:xfrm>
+            <a:off x="3222906" y="6336335"/>
+            <a:ext cx="1052883" cy="368528"/>
+          </a:xfrm>
+          <a:prstGeom prst="rect">
+            <a:avLst/>
+          </a:prstGeom>
+          <a:noFill/>
+          <a:ln>
+            <a:noFill/>
+          </a:ln>
+        </p:spPr>
+        <p:txBody>
+          <a:bodyPr spcFirstLastPara="1" wrap="square" lIns="75802" tIns="75802" rIns="75802" bIns="75802" anchor="t" anchorCtr="0">
+            <a:spAutoFit/>
+          </a:bodyPr>
+          <a:lstStyle/>
+          <a:p>
+            <a:pPr algn="ctr"/>
+            <a:r>
+              <a:rPr lang="de" b="1" dirty="0">
+                <a:solidFill>
+                  <a:schemeClr val="tx1">
+                    <a:lumMod val="65000"/>
+                    <a:lumOff val="35000"/>
+                  </a:schemeClr>
+                </a:solidFill>
+                <a:latin typeface="Roboto"/>
+                <a:ea typeface="Roboto"/>
+                <a:cs typeface="Roboto"/>
+                <a:sym typeface="Roboto"/>
+              </a:rPr>
+              <a:t>[MASKED]</a:t>
+            </a:r>
+            <a:endParaRPr b="1" dirty="0">
+              <a:solidFill>
+                <a:schemeClr val="tx1">
+                  <a:lumMod val="65000"/>
+                  <a:lumOff val="35000"/>
+                </a:schemeClr>
+              </a:solidFill>
+              <a:latin typeface="Roboto"/>
+              <a:ea typeface="Roboto"/>
+              <a:cs typeface="Roboto"/>
+              <a:sym typeface="Roboto"/>
+            </a:endParaRPr>
+          </a:p>
+        </p:txBody>
+      </p:sp>
+      <p:sp>
+        <p:nvSpPr>
+          <p:cNvPr id="4" name="Textfeld 3">
+            <a:extLst>
+              <a:ext uri="{FF2B5EF4-FFF2-40B4-BE49-F238E27FC236}">
+                <a16:creationId xmlns:a16="http://schemas.microsoft.com/office/drawing/2014/main" id="{418DCE8A-9A08-8145-E07B-A2B7A0951838}"/>
+              </a:ext>
+            </a:extLst>
+          </p:cNvPr>
+          <p:cNvSpPr txBox="1"/>
+          <p:nvPr/>
+        </p:nvSpPr>
+        <p:spPr>
+          <a:xfrm>
+            <a:off x="1404824" y="1623786"/>
+            <a:ext cx="4750018" cy="307777"/>
+          </a:xfrm>
+          <a:prstGeom prst="rect">
+            <a:avLst/>
+          </a:prstGeom>
+          <a:noFill/>
+        </p:spPr>
+        <p:txBody>
+          <a:bodyPr wrap="none" rtlCol="0">
+            <a:spAutoFit/>
+          </a:bodyPr>
+          <a:lstStyle/>
+          <a:p>
+            <a:r>
+              <a:rPr lang="de-DE" dirty="0">
+                <a:solidFill>
+                  <a:srgbClr val="FF0000"/>
+                </a:solidFill>
+              </a:rPr>
+              <a:t>Nur geeignet für beidseitigen Druck an der längeren Seite</a:t>
+            </a:r>
+          </a:p>
+        </p:txBody>
+      </p:sp>
+    </p:spTree>
+    <p:extLst>
+      <p:ext uri="{BB962C8B-B14F-4D97-AF65-F5344CB8AC3E}">
+        <p14:creationId xmlns:p14="http://schemas.microsoft.com/office/powerpoint/2010/main" val="4197724781"/>
+      </p:ext>
+    </p:extLst>
+  </p:cSld>
+  <p:clrMapOvr>
+    <a:masterClrMapping/>
+  </p:clrMapOvr>
+</p:sld>
+</file>
+
+<file path=ppt/slides/slide3.xml><?xml version="1.0" encoding="utf-8"?>
+<p:sld xmlns:a="http://schemas.openxmlformats.org/drawingml/2006/main" xmlns:r="http://schemas.openxmlformats.org/officeDocument/2006/relationships" xmlns:p="http://schemas.openxmlformats.org/presentationml/2006/main">
+  <p:cSld>
+    <p:spTree>
+      <p:nvGrpSpPr>
+        <p:cNvPr id="1" name="Shape 64"/>
+        <p:cNvGrpSpPr/>
+        <p:nvPr/>
+      </p:nvGrpSpPr>
+      <p:grpSpPr>
+        <a:xfrm>
+          <a:off x="0" y="0"/>
+          <a:ext cx="0" cy="0"/>
+          <a:chOff x="0" y="0"/>
+          <a:chExt cx="0" cy="0"/>
+        </a:xfrm>
+      </p:grpSpPr>
+      <p:sp>
+        <p:nvSpPr>
+          <p:cNvPr id="12" name="Google Shape;70;p14">
+            <a:extLst>
+              <a:ext uri="{FF2B5EF4-FFF2-40B4-BE49-F238E27FC236}">
+                <a16:creationId xmlns:a16="http://schemas.microsoft.com/office/drawing/2014/main" id="{FB148CA0-50D7-33E9-B776-9E861046033B}"/>
+              </a:ext>
+            </a:extLst>
+          </p:cNvPr>
+          <p:cNvSpPr/>
+          <p:nvPr/>
+        </p:nvSpPr>
+        <p:spPr>
+          <a:xfrm>
+            <a:off x="2414655" y="4466176"/>
+            <a:ext cx="2669387" cy="690978"/>
+          </a:xfrm>
+          <a:prstGeom prst="rect">
+            <a:avLst/>
+          </a:prstGeom>
+          <a:solidFill>
+            <a:schemeClr val="tx1"/>
+          </a:solidFill>
+          <a:ln>
+            <a:noFill/>
+          </a:ln>
+        </p:spPr>
+        <p:txBody>
+          <a:bodyPr spcFirstLastPara="1" wrap="square" lIns="75802" tIns="75802" rIns="75802" bIns="75802" anchor="ctr" anchorCtr="0">
+            <a:noAutofit/>
+          </a:bodyPr>
+          <a:lstStyle/>
+          <a:p>
+            <a:pPr algn="ctr"/>
+            <a:endParaRPr sz="991"/>
+          </a:p>
+        </p:txBody>
+      </p:sp>
+      <p:sp>
+        <p:nvSpPr>
+          <p:cNvPr id="11" name="Google Shape;70;p14">
+            <a:extLst>
+              <a:ext uri="{FF2B5EF4-FFF2-40B4-BE49-F238E27FC236}">
+                <a16:creationId xmlns:a16="http://schemas.microsoft.com/office/drawing/2014/main" id="{02711EBB-046C-7379-F7CC-A81B90722696}"/>
+              </a:ext>
+            </a:extLst>
+          </p:cNvPr>
+          <p:cNvSpPr/>
+          <p:nvPr/>
+        </p:nvSpPr>
+        <p:spPr>
+          <a:xfrm>
+            <a:off x="2414656" y="3629149"/>
+            <a:ext cx="2669387" cy="690978"/>
+          </a:xfrm>
+          <a:prstGeom prst="rect">
+            <a:avLst/>
+          </a:prstGeom>
+          <a:solidFill>
+            <a:schemeClr val="tx1"/>
+          </a:solidFill>
+          <a:ln>
+            <a:noFill/>
+          </a:ln>
+        </p:spPr>
+        <p:txBody>
+          <a:bodyPr spcFirstLastPara="1" wrap="square" lIns="75802" tIns="75802" rIns="75802" bIns="75802" anchor="ctr" anchorCtr="0">
+            <a:noAutofit/>
+          </a:bodyPr>
+          <a:lstStyle/>
+          <a:p>
+            <a:pPr algn="ctr"/>
+            <a:endParaRPr sz="991"/>
+          </a:p>
+        </p:txBody>
+      </p:sp>
+      <p:sp>
+        <p:nvSpPr>
+          <p:cNvPr id="10" name="Google Shape;70;p14">
+            <a:extLst>
+              <a:ext uri="{FF2B5EF4-FFF2-40B4-BE49-F238E27FC236}">
+                <a16:creationId xmlns:a16="http://schemas.microsoft.com/office/drawing/2014/main" id="{F4782E8B-5FB5-8F81-8005-24E1DC08773B}"/>
+              </a:ext>
+            </a:extLst>
+          </p:cNvPr>
+          <p:cNvSpPr/>
+          <p:nvPr/>
+        </p:nvSpPr>
+        <p:spPr>
+          <a:xfrm>
+            <a:off x="2414657" y="2783194"/>
+            <a:ext cx="2669387" cy="690978"/>
+          </a:xfrm>
+          <a:prstGeom prst="rect">
+            <a:avLst/>
+          </a:prstGeom>
+          <a:solidFill>
+            <a:srgbClr val="989898"/>
+          </a:solidFill>
+          <a:ln>
+            <a:noFill/>
+          </a:ln>
+        </p:spPr>
+        <p:txBody>
+          <a:bodyPr spcFirstLastPara="1" wrap="square" lIns="75802" tIns="75802" rIns="75802" bIns="75802" anchor="ctr" anchorCtr="0">
+            <a:noAutofit/>
+          </a:bodyPr>
+          <a:lstStyle/>
+          <a:p>
+            <a:pPr algn="ctr"/>
+            <a:endParaRPr sz="991"/>
+          </a:p>
+        </p:txBody>
+      </p:sp>
+      <p:sp>
+        <p:nvSpPr>
+          <p:cNvPr id="9" name="Google Shape;70;p14">
+            <a:extLst>
+              <a:ext uri="{FF2B5EF4-FFF2-40B4-BE49-F238E27FC236}">
+                <a16:creationId xmlns:a16="http://schemas.microsoft.com/office/drawing/2014/main" id="{F4BEC9BF-BB31-99FB-7BDD-C2DB074EE9B5}"/>
+              </a:ext>
+            </a:extLst>
+          </p:cNvPr>
+          <p:cNvSpPr/>
+          <p:nvPr/>
+        </p:nvSpPr>
+        <p:spPr>
+          <a:xfrm>
+            <a:off x="2414655" y="1940355"/>
+            <a:ext cx="2669387" cy="690978"/>
+          </a:xfrm>
+          <a:prstGeom prst="rect">
+            <a:avLst/>
+          </a:prstGeom>
+          <a:solidFill>
+            <a:schemeClr val="tx1"/>
+          </a:solidFill>
+          <a:ln>
+            <a:noFill/>
+          </a:ln>
+        </p:spPr>
+        <p:txBody>
+          <a:bodyPr spcFirstLastPara="1" wrap="square" lIns="75802" tIns="75802" rIns="75802" bIns="75802" anchor="ctr" anchorCtr="0">
+            <a:noAutofit/>
+          </a:bodyPr>
+          <a:lstStyle/>
+          <a:p>
+            <a:pPr algn="ctr"/>
+            <a:endParaRPr sz="991"/>
+          </a:p>
+        </p:txBody>
+      </p:sp>
+      <p:sp>
+        <p:nvSpPr>
+          <p:cNvPr id="70" name="Google Shape;70;p14"/>
+          <p:cNvSpPr/>
+          <p:nvPr/>
+        </p:nvSpPr>
+        <p:spPr>
+          <a:xfrm>
+            <a:off x="2414663" y="1097164"/>
+            <a:ext cx="2669387" cy="690978"/>
+          </a:xfrm>
+          <a:prstGeom prst="rect">
+            <a:avLst/>
+          </a:prstGeom>
+          <a:solidFill>
+            <a:schemeClr val="tx1"/>
+          </a:solidFill>
+          <a:ln>
+            <a:noFill/>
+          </a:ln>
+        </p:spPr>
+        <p:txBody>
+          <a:bodyPr spcFirstLastPara="1" wrap="square" lIns="75802" tIns="75802" rIns="75802" bIns="75802" anchor="ctr" anchorCtr="0">
+            <a:noAutofit/>
+          </a:bodyPr>
+          <a:lstStyle/>
+          <a:p>
+            <a:pPr algn="ctr"/>
+            <a:endParaRPr sz="991"/>
+          </a:p>
+        </p:txBody>
+      </p:sp>
+      <p:cxnSp>
+        <p:nvCxnSpPr>
+          <p:cNvPr id="71" name="Google Shape;71;p14"/>
+          <p:cNvCxnSpPr>
+            <a:cxnSpLocks/>
+          </p:cNvCxnSpPr>
+          <p:nvPr/>
+        </p:nvCxnSpPr>
+        <p:spPr>
+          <a:xfrm>
+            <a:off x="1935480" y="1438465"/>
+            <a:ext cx="401733" cy="0"/>
+          </a:xfrm>
+          <a:prstGeom prst="straightConnector1">
+            <a:avLst/>
+          </a:prstGeom>
+          <a:noFill/>
+          <a:ln w="38100" cap="flat" cmpd="sng">
+            <a:solidFill>
               <a:schemeClr val="dk2"/>
             </a:solidFill>
             <a:prstDash val="solid"/>
@@ -6518,6 +7085,1844 @@
           </a:ln>
         </p:spPr>
       </p:cxnSp>
+      <p:sp>
+        <p:nvSpPr>
+          <p:cNvPr id="72" name="Google Shape;72;p14"/>
+          <p:cNvSpPr txBox="1"/>
+          <p:nvPr/>
+        </p:nvSpPr>
+        <p:spPr>
+          <a:xfrm>
+            <a:off x="843872" y="1254201"/>
+            <a:ext cx="1052883" cy="368528"/>
+          </a:xfrm>
+          <a:prstGeom prst="rect">
+            <a:avLst/>
+          </a:prstGeom>
+          <a:noFill/>
+          <a:ln>
+            <a:noFill/>
+          </a:ln>
+        </p:spPr>
+        <p:txBody>
+          <a:bodyPr spcFirstLastPara="1" wrap="square" lIns="75802" tIns="75802" rIns="75802" bIns="75802" anchor="t" anchorCtr="0">
+            <a:spAutoFit/>
+          </a:bodyPr>
+          <a:lstStyle/>
+          <a:p>
+            <a:pPr algn="r"/>
+            <a:r>
+              <a:rPr lang="de" b="1" dirty="0">
+                <a:solidFill>
+                  <a:schemeClr val="dk2"/>
+                </a:solidFill>
+                <a:latin typeface="Roboto"/>
+                <a:ea typeface="Roboto"/>
+                <a:cs typeface="Roboto"/>
+                <a:sym typeface="Roboto"/>
+              </a:rPr>
+              <a:t>Eingabe 1</a:t>
+            </a:r>
+            <a:endParaRPr b="1" dirty="0">
+              <a:solidFill>
+                <a:schemeClr val="dk2"/>
+              </a:solidFill>
+              <a:latin typeface="Roboto"/>
+              <a:ea typeface="Roboto"/>
+              <a:cs typeface="Roboto"/>
+              <a:sym typeface="Roboto"/>
+            </a:endParaRPr>
+          </a:p>
+        </p:txBody>
+      </p:sp>
+      <p:cxnSp>
+        <p:nvCxnSpPr>
+          <p:cNvPr id="73" name="Google Shape;73;p14"/>
+          <p:cNvCxnSpPr>
+            <a:cxnSpLocks/>
+          </p:cNvCxnSpPr>
+          <p:nvPr/>
+        </p:nvCxnSpPr>
+        <p:spPr>
+          <a:xfrm>
+            <a:off x="1935480" y="2280747"/>
+            <a:ext cx="401733" cy="0"/>
+          </a:xfrm>
+          <a:prstGeom prst="straightConnector1">
+            <a:avLst/>
+          </a:prstGeom>
+          <a:noFill/>
+          <a:ln w="38100" cap="flat" cmpd="sng">
+            <a:solidFill>
+              <a:schemeClr val="dk2"/>
+            </a:solidFill>
+            <a:prstDash val="solid"/>
+            <a:round/>
+            <a:headEnd type="none" w="med" len="med"/>
+            <a:tailEnd type="triangle" w="med" len="med"/>
+          </a:ln>
+        </p:spPr>
+      </p:cxnSp>
+      <p:sp>
+        <p:nvSpPr>
+          <p:cNvPr id="74" name="Google Shape;74;p14"/>
+          <p:cNvSpPr txBox="1"/>
+          <p:nvPr/>
+        </p:nvSpPr>
+        <p:spPr>
+          <a:xfrm>
+            <a:off x="843871" y="2095121"/>
+            <a:ext cx="1052883" cy="368528"/>
+          </a:xfrm>
+          <a:prstGeom prst="rect">
+            <a:avLst/>
+          </a:prstGeom>
+          <a:noFill/>
+          <a:ln>
+            <a:noFill/>
+          </a:ln>
+        </p:spPr>
+        <p:txBody>
+          <a:bodyPr spcFirstLastPara="1" wrap="square" lIns="75802" tIns="75802" rIns="75802" bIns="75802" anchor="t" anchorCtr="0">
+            <a:spAutoFit/>
+          </a:bodyPr>
+          <a:lstStyle/>
+          <a:p>
+            <a:pPr algn="r"/>
+            <a:r>
+              <a:rPr lang="de" b="1" dirty="0">
+                <a:solidFill>
+                  <a:schemeClr val="dk2"/>
+                </a:solidFill>
+                <a:latin typeface="Roboto"/>
+                <a:ea typeface="Roboto"/>
+                <a:cs typeface="Roboto"/>
+                <a:sym typeface="Roboto"/>
+              </a:rPr>
+              <a:t>Eingabe 2</a:t>
+            </a:r>
+            <a:endParaRPr b="1" dirty="0">
+              <a:solidFill>
+                <a:schemeClr val="dk2"/>
+              </a:solidFill>
+              <a:latin typeface="Roboto"/>
+              <a:ea typeface="Roboto"/>
+              <a:cs typeface="Roboto"/>
+              <a:sym typeface="Roboto"/>
+            </a:endParaRPr>
+          </a:p>
+        </p:txBody>
+      </p:sp>
+      <p:cxnSp>
+        <p:nvCxnSpPr>
+          <p:cNvPr id="75" name="Google Shape;75;p14"/>
+          <p:cNvCxnSpPr>
+            <a:cxnSpLocks/>
+          </p:cNvCxnSpPr>
+          <p:nvPr/>
+        </p:nvCxnSpPr>
+        <p:spPr>
+          <a:xfrm>
+            <a:off x="1935480" y="3955003"/>
+            <a:ext cx="401733" cy="0"/>
+          </a:xfrm>
+          <a:prstGeom prst="straightConnector1">
+            <a:avLst/>
+          </a:prstGeom>
+          <a:noFill/>
+          <a:ln w="38100" cap="flat" cmpd="sng">
+            <a:solidFill>
+              <a:schemeClr val="dk2"/>
+            </a:solidFill>
+            <a:prstDash val="solid"/>
+            <a:round/>
+            <a:headEnd type="none" w="med" len="med"/>
+            <a:tailEnd type="triangle" w="med" len="med"/>
+          </a:ln>
+        </p:spPr>
+      </p:cxnSp>
+      <p:sp>
+        <p:nvSpPr>
+          <p:cNvPr id="76" name="Google Shape;76;p14"/>
+          <p:cNvSpPr txBox="1"/>
+          <p:nvPr/>
+        </p:nvSpPr>
+        <p:spPr>
+          <a:xfrm>
+            <a:off x="843870" y="3770739"/>
+            <a:ext cx="1052883" cy="368528"/>
+          </a:xfrm>
+          <a:prstGeom prst="rect">
+            <a:avLst/>
+          </a:prstGeom>
+          <a:noFill/>
+          <a:ln>
+            <a:noFill/>
+          </a:ln>
+        </p:spPr>
+        <p:txBody>
+          <a:bodyPr spcFirstLastPara="1" wrap="square" lIns="75802" tIns="75802" rIns="75802" bIns="75802" anchor="t" anchorCtr="0">
+            <a:spAutoFit/>
+          </a:bodyPr>
+          <a:lstStyle/>
+          <a:p>
+            <a:pPr algn="r"/>
+            <a:r>
+              <a:rPr lang="de" b="1" dirty="0">
+                <a:solidFill>
+                  <a:schemeClr val="dk2"/>
+                </a:solidFill>
+                <a:latin typeface="Roboto"/>
+                <a:ea typeface="Roboto"/>
+                <a:cs typeface="Roboto"/>
+                <a:sym typeface="Roboto"/>
+              </a:rPr>
+              <a:t>Eingabe 3</a:t>
+            </a:r>
+            <a:endParaRPr b="1" dirty="0">
+              <a:solidFill>
+                <a:schemeClr val="dk2"/>
+              </a:solidFill>
+              <a:latin typeface="Roboto"/>
+              <a:ea typeface="Roboto"/>
+              <a:cs typeface="Roboto"/>
+              <a:sym typeface="Roboto"/>
+            </a:endParaRPr>
+          </a:p>
+        </p:txBody>
+      </p:sp>
+      <p:cxnSp>
+        <p:nvCxnSpPr>
+          <p:cNvPr id="77" name="Google Shape;77;p14"/>
+          <p:cNvCxnSpPr>
+            <a:cxnSpLocks/>
+          </p:cNvCxnSpPr>
+          <p:nvPr/>
+        </p:nvCxnSpPr>
+        <p:spPr>
+          <a:xfrm>
+            <a:off x="1935479" y="4811665"/>
+            <a:ext cx="401486" cy="7445"/>
+          </a:xfrm>
+          <a:prstGeom prst="straightConnector1">
+            <a:avLst/>
+          </a:prstGeom>
+          <a:noFill/>
+          <a:ln w="38100" cap="flat" cmpd="sng">
+            <a:solidFill>
+              <a:schemeClr val="dk2"/>
+            </a:solidFill>
+            <a:prstDash val="solid"/>
+            <a:round/>
+            <a:headEnd type="none" w="med" len="med"/>
+            <a:tailEnd type="triangle" w="med" len="med"/>
+          </a:ln>
+        </p:spPr>
+      </p:cxnSp>
+      <p:sp>
+        <p:nvSpPr>
+          <p:cNvPr id="78" name="Google Shape;78;p14"/>
+          <p:cNvSpPr txBox="1"/>
+          <p:nvPr/>
+        </p:nvSpPr>
+        <p:spPr>
+          <a:xfrm>
+            <a:off x="843870" y="4627401"/>
+            <a:ext cx="1052883" cy="368528"/>
+          </a:xfrm>
+          <a:prstGeom prst="rect">
+            <a:avLst/>
+          </a:prstGeom>
+          <a:noFill/>
+          <a:ln>
+            <a:noFill/>
+          </a:ln>
+        </p:spPr>
+        <p:txBody>
+          <a:bodyPr spcFirstLastPara="1" wrap="square" lIns="75802" tIns="75802" rIns="75802" bIns="75802" anchor="t" anchorCtr="0">
+            <a:spAutoFit/>
+          </a:bodyPr>
+          <a:lstStyle/>
+          <a:p>
+            <a:pPr algn="r"/>
+            <a:r>
+              <a:rPr lang="de" b="1" dirty="0">
+                <a:solidFill>
+                  <a:schemeClr val="dk2"/>
+                </a:solidFill>
+                <a:latin typeface="Roboto"/>
+                <a:ea typeface="Roboto"/>
+                <a:cs typeface="Roboto"/>
+                <a:sym typeface="Roboto"/>
+              </a:rPr>
+              <a:t>Eingabe 4</a:t>
+            </a:r>
+            <a:endParaRPr b="1" dirty="0">
+              <a:solidFill>
+                <a:schemeClr val="dk2"/>
+              </a:solidFill>
+              <a:latin typeface="Roboto"/>
+              <a:ea typeface="Roboto"/>
+              <a:cs typeface="Roboto"/>
+              <a:sym typeface="Roboto"/>
+            </a:endParaRPr>
+          </a:p>
+        </p:txBody>
+      </p:sp>
+      <p:sp>
+        <p:nvSpPr>
+          <p:cNvPr id="80" name="Google Shape;80;p14"/>
+          <p:cNvSpPr txBox="1"/>
+          <p:nvPr/>
+        </p:nvSpPr>
+        <p:spPr>
+          <a:xfrm>
+            <a:off x="5590953" y="2944419"/>
+            <a:ext cx="1052883" cy="368528"/>
+          </a:xfrm>
+          <a:prstGeom prst="rect">
+            <a:avLst/>
+          </a:prstGeom>
+          <a:noFill/>
+          <a:ln>
+            <a:noFill/>
+          </a:ln>
+        </p:spPr>
+        <p:txBody>
+          <a:bodyPr spcFirstLastPara="1" wrap="square" lIns="75802" tIns="75802" rIns="75802" bIns="75802" anchor="t" anchorCtr="0">
+            <a:spAutoFit/>
+          </a:bodyPr>
+          <a:lstStyle/>
+          <a:p>
+            <a:r>
+              <a:rPr lang="de" b="1" dirty="0">
+                <a:solidFill>
+                  <a:srgbClr val="595959"/>
+                </a:solidFill>
+                <a:latin typeface="Roboto"/>
+                <a:ea typeface="Roboto"/>
+                <a:cs typeface="Roboto"/>
+                <a:sym typeface="Roboto"/>
+              </a:rPr>
+              <a:t>Ausgabe</a:t>
+            </a:r>
+            <a:endParaRPr b="1" dirty="0">
+              <a:solidFill>
+                <a:srgbClr val="595959"/>
+              </a:solidFill>
+              <a:latin typeface="Roboto"/>
+              <a:ea typeface="Roboto"/>
+              <a:cs typeface="Roboto"/>
+              <a:sym typeface="Roboto"/>
+            </a:endParaRPr>
+          </a:p>
+        </p:txBody>
+      </p:sp>
+      <p:cxnSp>
+        <p:nvCxnSpPr>
+          <p:cNvPr id="21" name="Google Shape;71;p14">
+            <a:extLst>
+              <a:ext uri="{FF2B5EF4-FFF2-40B4-BE49-F238E27FC236}">
+                <a16:creationId xmlns:a16="http://schemas.microsoft.com/office/drawing/2014/main" id="{F0FA4A01-8EAB-C9DB-CBEF-EB1DF7BBA454}"/>
+              </a:ext>
+            </a:extLst>
+          </p:cNvPr>
+          <p:cNvCxnSpPr>
+            <a:cxnSpLocks/>
+          </p:cNvCxnSpPr>
+          <p:nvPr/>
+        </p:nvCxnSpPr>
+        <p:spPr>
+          <a:xfrm>
+            <a:off x="5189220" y="3128683"/>
+            <a:ext cx="401733" cy="0"/>
+          </a:xfrm>
+          <a:prstGeom prst="straightConnector1">
+            <a:avLst/>
+          </a:prstGeom>
+          <a:noFill/>
+          <a:ln w="38100" cap="flat" cmpd="sng">
+            <a:solidFill>
+              <a:srgbClr val="595959"/>
+            </a:solidFill>
+            <a:prstDash val="solid"/>
+            <a:round/>
+            <a:headEnd type="none" w="med" len="med"/>
+            <a:tailEnd type="triangle" w="med" len="med"/>
+          </a:ln>
+        </p:spPr>
+      </p:cxnSp>
+      <p:sp>
+        <p:nvSpPr>
+          <p:cNvPr id="2" name="Google Shape;72;p14">
+            <a:extLst>
+              <a:ext uri="{FF2B5EF4-FFF2-40B4-BE49-F238E27FC236}">
+                <a16:creationId xmlns:a16="http://schemas.microsoft.com/office/drawing/2014/main" id="{3498EBA5-0AF2-6D68-7E34-4B063DE8B055}"/>
+              </a:ext>
+            </a:extLst>
+          </p:cNvPr>
+          <p:cNvSpPr txBox="1"/>
+          <p:nvPr/>
+        </p:nvSpPr>
+        <p:spPr>
+          <a:xfrm>
+            <a:off x="2081153" y="605726"/>
+            <a:ext cx="3336390" cy="399306"/>
+          </a:xfrm>
+          <a:prstGeom prst="rect">
+            <a:avLst/>
+          </a:prstGeom>
+          <a:noFill/>
+          <a:ln>
+            <a:noFill/>
+          </a:ln>
+        </p:spPr>
+        <p:txBody>
+          <a:bodyPr spcFirstLastPara="1" wrap="square" lIns="75802" tIns="75802" rIns="75802" bIns="75802" anchor="t" anchorCtr="0">
+            <a:spAutoFit/>
+          </a:bodyPr>
+          <a:lstStyle/>
+          <a:p>
+            <a:pPr algn="ctr"/>
+            <a:r>
+              <a:rPr lang="de" sz="1600" b="1" dirty="0">
+                <a:solidFill>
+                  <a:schemeClr val="accent4">
+                    <a:lumMod val="75000"/>
+                  </a:schemeClr>
+                </a:solidFill>
+                <a:latin typeface="Roboto"/>
+                <a:ea typeface="Roboto"/>
+                <a:cs typeface="Roboto"/>
+                <a:sym typeface="Roboto"/>
+              </a:rPr>
+              <a:t>Masked Language Modelling</a:t>
+            </a:r>
+            <a:endParaRPr sz="1600" b="1" dirty="0">
+              <a:solidFill>
+                <a:schemeClr val="accent4">
+                  <a:lumMod val="75000"/>
+                </a:schemeClr>
+              </a:solidFill>
+              <a:latin typeface="Roboto"/>
+              <a:ea typeface="Roboto"/>
+              <a:cs typeface="Roboto"/>
+              <a:sym typeface="Roboto"/>
+            </a:endParaRPr>
+          </a:p>
+        </p:txBody>
+      </p:sp>
+      <p:sp>
+        <p:nvSpPr>
+          <p:cNvPr id="3" name="Google Shape;74;p14">
+            <a:extLst>
+              <a:ext uri="{FF2B5EF4-FFF2-40B4-BE49-F238E27FC236}">
+                <a16:creationId xmlns:a16="http://schemas.microsoft.com/office/drawing/2014/main" id="{67F0E006-B3C6-F46A-0BD9-2AA18ED7F9BC}"/>
+              </a:ext>
+            </a:extLst>
+          </p:cNvPr>
+          <p:cNvSpPr txBox="1"/>
+          <p:nvPr/>
+        </p:nvSpPr>
+        <p:spPr>
+          <a:xfrm>
+            <a:off x="3222906" y="2942895"/>
+            <a:ext cx="1052883" cy="368528"/>
+          </a:xfrm>
+          <a:prstGeom prst="rect">
+            <a:avLst/>
+          </a:prstGeom>
+          <a:noFill/>
+          <a:ln>
+            <a:noFill/>
+          </a:ln>
+        </p:spPr>
+        <p:txBody>
+          <a:bodyPr spcFirstLastPara="1" wrap="square" lIns="75802" tIns="75802" rIns="75802" bIns="75802" anchor="t" anchorCtr="0">
+            <a:spAutoFit/>
+          </a:bodyPr>
+          <a:lstStyle/>
+          <a:p>
+            <a:pPr algn="ctr"/>
+            <a:r>
+              <a:rPr lang="de" b="1" dirty="0">
+                <a:solidFill>
+                  <a:schemeClr val="tx1">
+                    <a:lumMod val="65000"/>
+                    <a:lumOff val="35000"/>
+                  </a:schemeClr>
+                </a:solidFill>
+                <a:latin typeface="Roboto"/>
+                <a:ea typeface="Roboto"/>
+                <a:cs typeface="Roboto"/>
+                <a:sym typeface="Roboto"/>
+              </a:rPr>
+              <a:t>[MASKED]</a:t>
+            </a:r>
+            <a:endParaRPr b="1" dirty="0">
+              <a:solidFill>
+                <a:schemeClr val="tx1">
+                  <a:lumMod val="65000"/>
+                  <a:lumOff val="35000"/>
+                </a:schemeClr>
+              </a:solidFill>
+              <a:latin typeface="Roboto"/>
+              <a:ea typeface="Roboto"/>
+              <a:cs typeface="Roboto"/>
+              <a:sym typeface="Roboto"/>
+            </a:endParaRPr>
+          </a:p>
+        </p:txBody>
+      </p:sp>
+      <p:sp>
+        <p:nvSpPr>
+          <p:cNvPr id="16" name="Google Shape;58;p13">
+            <a:extLst>
+              <a:ext uri="{FF2B5EF4-FFF2-40B4-BE49-F238E27FC236}">
+                <a16:creationId xmlns:a16="http://schemas.microsoft.com/office/drawing/2014/main" id="{62190DD4-1AE3-5FD6-A56E-89AD96C5858C}"/>
+              </a:ext>
+            </a:extLst>
+          </p:cNvPr>
+          <p:cNvSpPr/>
+          <p:nvPr/>
+        </p:nvSpPr>
+        <p:spPr>
+          <a:xfrm>
+            <a:off x="2492351" y="1174860"/>
+            <a:ext cx="2513992" cy="535939"/>
+          </a:xfrm>
+          <a:prstGeom prst="rect">
+            <a:avLst/>
+          </a:prstGeom>
+          <a:noFill/>
+          <a:ln w="6350" cap="flat" cmpd="sng">
+            <a:solidFill>
+              <a:schemeClr val="lt2"/>
+            </a:solidFill>
+            <a:prstDash val="solid"/>
+            <a:round/>
+            <a:headEnd type="none" w="sm" len="sm"/>
+            <a:tailEnd type="none" w="sm" len="sm"/>
+          </a:ln>
+        </p:spPr>
+        <p:txBody>
+          <a:bodyPr spcFirstLastPara="1" wrap="square" lIns="75802" tIns="75802" rIns="75802" bIns="75802" anchor="ctr" anchorCtr="0">
+            <a:noAutofit/>
+          </a:bodyPr>
+          <a:lstStyle/>
+          <a:p>
+            <a:pPr algn="ctr"/>
+            <a:endParaRPr sz="991"/>
+          </a:p>
+        </p:txBody>
+      </p:sp>
+      <p:cxnSp>
+        <p:nvCxnSpPr>
+          <p:cNvPr id="22" name="Google Shape;59;p13">
+            <a:extLst>
+              <a:ext uri="{FF2B5EF4-FFF2-40B4-BE49-F238E27FC236}">
+                <a16:creationId xmlns:a16="http://schemas.microsoft.com/office/drawing/2014/main" id="{BBA4957C-5EE2-3A26-B798-074CFD72A92C}"/>
+              </a:ext>
+            </a:extLst>
+          </p:cNvPr>
+          <p:cNvCxnSpPr>
+            <a:cxnSpLocks/>
+          </p:cNvCxnSpPr>
+          <p:nvPr/>
+        </p:nvCxnSpPr>
+        <p:spPr>
+          <a:xfrm rot="10800000">
+            <a:off x="-3" y="520249"/>
+            <a:ext cx="7559675" cy="0"/>
+          </a:xfrm>
+          <a:prstGeom prst="straightConnector1">
+            <a:avLst/>
+          </a:prstGeom>
+          <a:noFill/>
+          <a:ln w="12700" cap="flat" cmpd="sng">
+            <a:solidFill>
+              <a:schemeClr val="lt2"/>
+            </a:solidFill>
+            <a:prstDash val="solid"/>
+            <a:round/>
+            <a:headEnd type="none" w="med" len="med"/>
+            <a:tailEnd type="none" w="med" len="med"/>
+          </a:ln>
+        </p:spPr>
+      </p:cxnSp>
+      <p:cxnSp>
+        <p:nvCxnSpPr>
+          <p:cNvPr id="23" name="Google Shape;60;p13">
+            <a:extLst>
+              <a:ext uri="{FF2B5EF4-FFF2-40B4-BE49-F238E27FC236}">
+                <a16:creationId xmlns:a16="http://schemas.microsoft.com/office/drawing/2014/main" id="{0DB35C55-674F-DF61-81C6-0C188EFA939F}"/>
+              </a:ext>
+            </a:extLst>
+          </p:cNvPr>
+          <p:cNvCxnSpPr>
+            <a:cxnSpLocks/>
+          </p:cNvCxnSpPr>
+          <p:nvPr/>
+        </p:nvCxnSpPr>
+        <p:spPr>
+          <a:xfrm rot="10800000">
+            <a:off x="-4" y="5387340"/>
+            <a:ext cx="7559675" cy="0"/>
+          </a:xfrm>
+          <a:prstGeom prst="straightConnector1">
+            <a:avLst/>
+          </a:prstGeom>
+          <a:noFill/>
+          <a:ln w="12700" cap="flat" cmpd="sng">
+            <a:solidFill>
+              <a:schemeClr val="lt2"/>
+            </a:solidFill>
+            <a:prstDash val="solid"/>
+            <a:round/>
+            <a:headEnd type="none" w="med" len="med"/>
+            <a:tailEnd type="none" w="med" len="med"/>
+          </a:ln>
+        </p:spPr>
+      </p:cxnSp>
+      <p:cxnSp>
+        <p:nvCxnSpPr>
+          <p:cNvPr id="24" name="Google Shape;59;p13">
+            <a:extLst>
+              <a:ext uri="{FF2B5EF4-FFF2-40B4-BE49-F238E27FC236}">
+                <a16:creationId xmlns:a16="http://schemas.microsoft.com/office/drawing/2014/main" id="{9BC07DEC-DD38-676B-452D-FBD49527127D}"/>
+              </a:ext>
+            </a:extLst>
+          </p:cNvPr>
+          <p:cNvCxnSpPr>
+            <a:cxnSpLocks/>
+          </p:cNvCxnSpPr>
+          <p:nvPr/>
+        </p:nvCxnSpPr>
+        <p:spPr>
+          <a:xfrm>
+            <a:off x="6840000" y="8128"/>
+            <a:ext cx="0" cy="5733946"/>
+          </a:xfrm>
+          <a:prstGeom prst="straightConnector1">
+            <a:avLst/>
+          </a:prstGeom>
+          <a:noFill/>
+          <a:ln w="12700" cap="flat" cmpd="sng">
+            <a:solidFill>
+              <a:schemeClr val="lt2"/>
+            </a:solidFill>
+            <a:prstDash val="solid"/>
+            <a:round/>
+            <a:headEnd type="none" w="med" len="med"/>
+            <a:tailEnd type="none" w="med" len="med"/>
+          </a:ln>
+        </p:spPr>
+      </p:cxnSp>
+      <p:cxnSp>
+        <p:nvCxnSpPr>
+          <p:cNvPr id="25" name="Google Shape;59;p13">
+            <a:extLst>
+              <a:ext uri="{FF2B5EF4-FFF2-40B4-BE49-F238E27FC236}">
+                <a16:creationId xmlns:a16="http://schemas.microsoft.com/office/drawing/2014/main" id="{0E59D5DD-A256-8108-DB09-2E04CCEAB8B2}"/>
+              </a:ext>
+            </a:extLst>
+          </p:cNvPr>
+          <p:cNvCxnSpPr>
+            <a:cxnSpLocks/>
+          </p:cNvCxnSpPr>
+          <p:nvPr/>
+        </p:nvCxnSpPr>
+        <p:spPr>
+          <a:xfrm>
+            <a:off x="720000" y="8128"/>
+            <a:ext cx="0" cy="5733946"/>
+          </a:xfrm>
+          <a:prstGeom prst="straightConnector1">
+            <a:avLst/>
+          </a:prstGeom>
+          <a:noFill/>
+          <a:ln w="12700" cap="flat" cmpd="sng">
+            <a:solidFill>
+              <a:schemeClr val="lt2"/>
+            </a:solidFill>
+            <a:prstDash val="solid"/>
+            <a:round/>
+            <a:headEnd type="none" w="med" len="med"/>
+            <a:tailEnd type="none" w="med" len="med"/>
+          </a:ln>
+        </p:spPr>
+      </p:cxnSp>
+      <p:sp>
+        <p:nvSpPr>
+          <p:cNvPr id="26" name="Google Shape;58;p13">
+            <a:extLst>
+              <a:ext uri="{FF2B5EF4-FFF2-40B4-BE49-F238E27FC236}">
+                <a16:creationId xmlns:a16="http://schemas.microsoft.com/office/drawing/2014/main" id="{A566A36F-0778-476A-D1FB-3B8CC45EE4B9}"/>
+              </a:ext>
+            </a:extLst>
+          </p:cNvPr>
+          <p:cNvSpPr/>
+          <p:nvPr/>
+        </p:nvSpPr>
+        <p:spPr>
+          <a:xfrm>
+            <a:off x="2492351" y="2009917"/>
+            <a:ext cx="2513992" cy="535939"/>
+          </a:xfrm>
+          <a:prstGeom prst="rect">
+            <a:avLst/>
+          </a:prstGeom>
+          <a:noFill/>
+          <a:ln w="6350" cap="flat" cmpd="sng">
+            <a:solidFill>
+              <a:schemeClr val="lt2"/>
+            </a:solidFill>
+            <a:prstDash val="solid"/>
+            <a:round/>
+            <a:headEnd type="none" w="sm" len="sm"/>
+            <a:tailEnd type="none" w="sm" len="sm"/>
+          </a:ln>
+        </p:spPr>
+        <p:txBody>
+          <a:bodyPr spcFirstLastPara="1" wrap="square" lIns="75802" tIns="75802" rIns="75802" bIns="75802" anchor="ctr" anchorCtr="0">
+            <a:noAutofit/>
+          </a:bodyPr>
+          <a:lstStyle/>
+          <a:p>
+            <a:pPr algn="ctr"/>
+            <a:endParaRPr sz="991"/>
+          </a:p>
+        </p:txBody>
+      </p:sp>
+      <p:sp>
+        <p:nvSpPr>
+          <p:cNvPr id="27" name="Google Shape;58;p13">
+            <a:extLst>
+              <a:ext uri="{FF2B5EF4-FFF2-40B4-BE49-F238E27FC236}">
+                <a16:creationId xmlns:a16="http://schemas.microsoft.com/office/drawing/2014/main" id="{4D2C9247-57FB-3B45-31E6-4B7287B420A7}"/>
+              </a:ext>
+            </a:extLst>
+          </p:cNvPr>
+          <p:cNvSpPr/>
+          <p:nvPr/>
+        </p:nvSpPr>
+        <p:spPr>
+          <a:xfrm>
+            <a:off x="2492351" y="3705785"/>
+            <a:ext cx="2513992" cy="535939"/>
+          </a:xfrm>
+          <a:prstGeom prst="rect">
+            <a:avLst/>
+          </a:prstGeom>
+          <a:noFill/>
+          <a:ln w="6350" cap="flat" cmpd="sng">
+            <a:solidFill>
+              <a:schemeClr val="lt2"/>
+            </a:solidFill>
+            <a:prstDash val="solid"/>
+            <a:round/>
+            <a:headEnd type="none" w="sm" len="sm"/>
+            <a:tailEnd type="none" w="sm" len="sm"/>
+          </a:ln>
+        </p:spPr>
+        <p:txBody>
+          <a:bodyPr spcFirstLastPara="1" wrap="square" lIns="75802" tIns="75802" rIns="75802" bIns="75802" anchor="ctr" anchorCtr="0">
+            <a:noAutofit/>
+          </a:bodyPr>
+          <a:lstStyle/>
+          <a:p>
+            <a:pPr algn="ctr"/>
+            <a:endParaRPr sz="991"/>
+          </a:p>
+        </p:txBody>
+      </p:sp>
+      <p:sp>
+        <p:nvSpPr>
+          <p:cNvPr id="28" name="Google Shape;58;p13">
+            <a:extLst>
+              <a:ext uri="{FF2B5EF4-FFF2-40B4-BE49-F238E27FC236}">
+                <a16:creationId xmlns:a16="http://schemas.microsoft.com/office/drawing/2014/main" id="{3ECAF7E0-1408-77DB-71BC-D0C233564636}"/>
+              </a:ext>
+            </a:extLst>
+          </p:cNvPr>
+          <p:cNvSpPr/>
+          <p:nvPr/>
+        </p:nvSpPr>
+        <p:spPr>
+          <a:xfrm>
+            <a:off x="2492351" y="4538755"/>
+            <a:ext cx="2513992" cy="535939"/>
+          </a:xfrm>
+          <a:prstGeom prst="rect">
+            <a:avLst/>
+          </a:prstGeom>
+          <a:noFill/>
+          <a:ln w="6350" cap="flat" cmpd="sng">
+            <a:solidFill>
+              <a:schemeClr val="lt2"/>
+            </a:solidFill>
+            <a:prstDash val="solid"/>
+            <a:round/>
+            <a:headEnd type="none" w="sm" len="sm"/>
+            <a:tailEnd type="none" w="sm" len="sm"/>
+          </a:ln>
+        </p:spPr>
+        <p:txBody>
+          <a:bodyPr spcFirstLastPara="1" wrap="square" lIns="75802" tIns="75802" rIns="75802" bIns="75802" anchor="ctr" anchorCtr="0">
+            <a:noAutofit/>
+          </a:bodyPr>
+          <a:lstStyle/>
+          <a:p>
+            <a:pPr algn="ctr"/>
+            <a:endParaRPr sz="991"/>
+          </a:p>
+        </p:txBody>
+      </p:sp>
+      <p:sp>
+        <p:nvSpPr>
+          <p:cNvPr id="29" name="Google Shape;70;p14">
+            <a:extLst>
+              <a:ext uri="{FF2B5EF4-FFF2-40B4-BE49-F238E27FC236}">
+                <a16:creationId xmlns:a16="http://schemas.microsoft.com/office/drawing/2014/main" id="{04A3B991-2613-26B0-124F-9D87181D388A}"/>
+              </a:ext>
+            </a:extLst>
+          </p:cNvPr>
+          <p:cNvSpPr/>
+          <p:nvPr/>
+        </p:nvSpPr>
+        <p:spPr>
+          <a:xfrm>
+            <a:off x="2414655" y="9331743"/>
+            <a:ext cx="2669387" cy="690978"/>
+          </a:xfrm>
+          <a:prstGeom prst="rect">
+            <a:avLst/>
+          </a:prstGeom>
+          <a:solidFill>
+            <a:schemeClr val="tx1"/>
+          </a:solidFill>
+          <a:ln>
+            <a:noFill/>
+          </a:ln>
+        </p:spPr>
+        <p:txBody>
+          <a:bodyPr spcFirstLastPara="1" wrap="square" lIns="75802" tIns="75802" rIns="75802" bIns="75802" anchor="ctr" anchorCtr="0">
+            <a:noAutofit/>
+          </a:bodyPr>
+          <a:lstStyle/>
+          <a:p>
+            <a:pPr algn="ctr"/>
+            <a:endParaRPr sz="991"/>
+          </a:p>
+        </p:txBody>
+      </p:sp>
+      <p:sp>
+        <p:nvSpPr>
+          <p:cNvPr id="30" name="Google Shape;70;p14">
+            <a:extLst>
+              <a:ext uri="{FF2B5EF4-FFF2-40B4-BE49-F238E27FC236}">
+                <a16:creationId xmlns:a16="http://schemas.microsoft.com/office/drawing/2014/main" id="{DB2DE871-10CE-3EB7-A74C-5D469D307B86}"/>
+              </a:ext>
+            </a:extLst>
+          </p:cNvPr>
+          <p:cNvSpPr/>
+          <p:nvPr/>
+        </p:nvSpPr>
+        <p:spPr>
+          <a:xfrm>
+            <a:off x="2414656" y="8494716"/>
+            <a:ext cx="2669387" cy="690978"/>
+          </a:xfrm>
+          <a:prstGeom prst="rect">
+            <a:avLst/>
+          </a:prstGeom>
+          <a:solidFill>
+            <a:schemeClr val="tx1"/>
+          </a:solidFill>
+          <a:ln>
+            <a:noFill/>
+          </a:ln>
+        </p:spPr>
+        <p:txBody>
+          <a:bodyPr spcFirstLastPara="1" wrap="square" lIns="75802" tIns="75802" rIns="75802" bIns="75802" anchor="ctr" anchorCtr="0">
+            <a:noAutofit/>
+          </a:bodyPr>
+          <a:lstStyle/>
+          <a:p>
+            <a:pPr algn="ctr"/>
+            <a:endParaRPr sz="991"/>
+          </a:p>
+        </p:txBody>
+      </p:sp>
+      <p:sp>
+        <p:nvSpPr>
+          <p:cNvPr id="31" name="Google Shape;70;p14">
+            <a:extLst>
+              <a:ext uri="{FF2B5EF4-FFF2-40B4-BE49-F238E27FC236}">
+                <a16:creationId xmlns:a16="http://schemas.microsoft.com/office/drawing/2014/main" id="{D59DD58E-C312-D01C-5806-97B5646C7C63}"/>
+              </a:ext>
+            </a:extLst>
+          </p:cNvPr>
+          <p:cNvSpPr/>
+          <p:nvPr/>
+        </p:nvSpPr>
+        <p:spPr>
+          <a:xfrm>
+            <a:off x="2414657" y="7648761"/>
+            <a:ext cx="2669387" cy="690978"/>
+          </a:xfrm>
+          <a:prstGeom prst="rect">
+            <a:avLst/>
+          </a:prstGeom>
+          <a:solidFill>
+            <a:srgbClr val="989898"/>
+          </a:solidFill>
+          <a:ln>
+            <a:noFill/>
+          </a:ln>
+        </p:spPr>
+        <p:txBody>
+          <a:bodyPr spcFirstLastPara="1" wrap="square" lIns="75802" tIns="75802" rIns="75802" bIns="75802" anchor="ctr" anchorCtr="0">
+            <a:noAutofit/>
+          </a:bodyPr>
+          <a:lstStyle/>
+          <a:p>
+            <a:pPr algn="ctr"/>
+            <a:endParaRPr sz="991"/>
+          </a:p>
+        </p:txBody>
+      </p:sp>
+      <p:sp>
+        <p:nvSpPr>
+          <p:cNvPr id="32" name="Google Shape;70;p14">
+            <a:extLst>
+              <a:ext uri="{FF2B5EF4-FFF2-40B4-BE49-F238E27FC236}">
+                <a16:creationId xmlns:a16="http://schemas.microsoft.com/office/drawing/2014/main" id="{C0F9A545-191F-19B1-8BA0-CF99269E256D}"/>
+              </a:ext>
+            </a:extLst>
+          </p:cNvPr>
+          <p:cNvSpPr/>
+          <p:nvPr/>
+        </p:nvSpPr>
+        <p:spPr>
+          <a:xfrm>
+            <a:off x="2414655" y="6805922"/>
+            <a:ext cx="2669387" cy="690978"/>
+          </a:xfrm>
+          <a:prstGeom prst="rect">
+            <a:avLst/>
+          </a:prstGeom>
+          <a:solidFill>
+            <a:schemeClr val="tx1"/>
+          </a:solidFill>
+          <a:ln>
+            <a:noFill/>
+          </a:ln>
+        </p:spPr>
+        <p:txBody>
+          <a:bodyPr spcFirstLastPara="1" wrap="square" lIns="75802" tIns="75802" rIns="75802" bIns="75802" anchor="ctr" anchorCtr="0">
+            <a:noAutofit/>
+          </a:bodyPr>
+          <a:lstStyle/>
+          <a:p>
+            <a:pPr algn="ctr"/>
+            <a:endParaRPr sz="991"/>
+          </a:p>
+        </p:txBody>
+      </p:sp>
+      <p:sp>
+        <p:nvSpPr>
+          <p:cNvPr id="33" name="Google Shape;70;p14">
+            <a:extLst>
+              <a:ext uri="{FF2B5EF4-FFF2-40B4-BE49-F238E27FC236}">
+                <a16:creationId xmlns:a16="http://schemas.microsoft.com/office/drawing/2014/main" id="{278B031C-525C-572B-34E7-A384099A8FCC}"/>
+              </a:ext>
+            </a:extLst>
+          </p:cNvPr>
+          <p:cNvSpPr/>
+          <p:nvPr/>
+        </p:nvSpPr>
+        <p:spPr>
+          <a:xfrm>
+            <a:off x="2414663" y="5962731"/>
+            <a:ext cx="2669387" cy="690978"/>
+          </a:xfrm>
+          <a:prstGeom prst="rect">
+            <a:avLst/>
+          </a:prstGeom>
+          <a:solidFill>
+            <a:schemeClr val="tx1"/>
+          </a:solidFill>
+          <a:ln>
+            <a:noFill/>
+          </a:ln>
+        </p:spPr>
+        <p:txBody>
+          <a:bodyPr spcFirstLastPara="1" wrap="square" lIns="75802" tIns="75802" rIns="75802" bIns="75802" anchor="ctr" anchorCtr="0">
+            <a:noAutofit/>
+          </a:bodyPr>
+          <a:lstStyle/>
+          <a:p>
+            <a:pPr algn="ctr"/>
+            <a:endParaRPr sz="991"/>
+          </a:p>
+        </p:txBody>
+      </p:sp>
+      <p:cxnSp>
+        <p:nvCxnSpPr>
+          <p:cNvPr id="34" name="Google Shape;71;p14">
+            <a:extLst>
+              <a:ext uri="{FF2B5EF4-FFF2-40B4-BE49-F238E27FC236}">
+                <a16:creationId xmlns:a16="http://schemas.microsoft.com/office/drawing/2014/main" id="{4E08FD69-51F4-14F7-578B-867F8BFD1AAD}"/>
+              </a:ext>
+            </a:extLst>
+          </p:cNvPr>
+          <p:cNvCxnSpPr>
+            <a:cxnSpLocks/>
+          </p:cNvCxnSpPr>
+          <p:nvPr/>
+        </p:nvCxnSpPr>
+        <p:spPr>
+          <a:xfrm>
+            <a:off x="1935480" y="6304032"/>
+            <a:ext cx="401733" cy="0"/>
+          </a:xfrm>
+          <a:prstGeom prst="straightConnector1">
+            <a:avLst/>
+          </a:prstGeom>
+          <a:noFill/>
+          <a:ln w="38100" cap="flat" cmpd="sng">
+            <a:solidFill>
+              <a:schemeClr val="dk2"/>
+            </a:solidFill>
+            <a:prstDash val="solid"/>
+            <a:round/>
+            <a:headEnd type="none" w="med" len="med"/>
+            <a:tailEnd type="triangle" w="med" len="med"/>
+          </a:ln>
+        </p:spPr>
+      </p:cxnSp>
+      <p:sp>
+        <p:nvSpPr>
+          <p:cNvPr id="35" name="Google Shape;72;p14">
+            <a:extLst>
+              <a:ext uri="{FF2B5EF4-FFF2-40B4-BE49-F238E27FC236}">
+                <a16:creationId xmlns:a16="http://schemas.microsoft.com/office/drawing/2014/main" id="{087D2048-A5BF-302F-5ADD-96FE9FDAEC4F}"/>
+              </a:ext>
+            </a:extLst>
+          </p:cNvPr>
+          <p:cNvSpPr txBox="1"/>
+          <p:nvPr/>
+        </p:nvSpPr>
+        <p:spPr>
+          <a:xfrm>
+            <a:off x="843872" y="6119768"/>
+            <a:ext cx="1052883" cy="368528"/>
+          </a:xfrm>
+          <a:prstGeom prst="rect">
+            <a:avLst/>
+          </a:prstGeom>
+          <a:noFill/>
+          <a:ln>
+            <a:noFill/>
+          </a:ln>
+        </p:spPr>
+        <p:txBody>
+          <a:bodyPr spcFirstLastPara="1" wrap="square" lIns="75802" tIns="75802" rIns="75802" bIns="75802" anchor="t" anchorCtr="0">
+            <a:spAutoFit/>
+          </a:bodyPr>
+          <a:lstStyle/>
+          <a:p>
+            <a:pPr algn="r"/>
+            <a:r>
+              <a:rPr lang="de" b="1" dirty="0">
+                <a:solidFill>
+                  <a:schemeClr val="dk2"/>
+                </a:solidFill>
+                <a:latin typeface="Roboto"/>
+                <a:ea typeface="Roboto"/>
+                <a:cs typeface="Roboto"/>
+                <a:sym typeface="Roboto"/>
+              </a:rPr>
+              <a:t>Eingabe 1</a:t>
+            </a:r>
+            <a:endParaRPr b="1" dirty="0">
+              <a:solidFill>
+                <a:schemeClr val="dk2"/>
+              </a:solidFill>
+              <a:latin typeface="Roboto"/>
+              <a:ea typeface="Roboto"/>
+              <a:cs typeface="Roboto"/>
+              <a:sym typeface="Roboto"/>
+            </a:endParaRPr>
+          </a:p>
+        </p:txBody>
+      </p:sp>
+      <p:cxnSp>
+        <p:nvCxnSpPr>
+          <p:cNvPr id="36" name="Google Shape;73;p14">
+            <a:extLst>
+              <a:ext uri="{FF2B5EF4-FFF2-40B4-BE49-F238E27FC236}">
+                <a16:creationId xmlns:a16="http://schemas.microsoft.com/office/drawing/2014/main" id="{64DCD171-58A7-6A53-D99E-05755AF15757}"/>
+              </a:ext>
+            </a:extLst>
+          </p:cNvPr>
+          <p:cNvCxnSpPr>
+            <a:cxnSpLocks/>
+          </p:cNvCxnSpPr>
+          <p:nvPr/>
+        </p:nvCxnSpPr>
+        <p:spPr>
+          <a:xfrm>
+            <a:off x="1935480" y="7146314"/>
+            <a:ext cx="401733" cy="0"/>
+          </a:xfrm>
+          <a:prstGeom prst="straightConnector1">
+            <a:avLst/>
+          </a:prstGeom>
+          <a:noFill/>
+          <a:ln w="38100" cap="flat" cmpd="sng">
+            <a:solidFill>
+              <a:schemeClr val="dk2"/>
+            </a:solidFill>
+            <a:prstDash val="solid"/>
+            <a:round/>
+            <a:headEnd type="none" w="med" len="med"/>
+            <a:tailEnd type="triangle" w="med" len="med"/>
+          </a:ln>
+        </p:spPr>
+      </p:cxnSp>
+      <p:sp>
+        <p:nvSpPr>
+          <p:cNvPr id="37" name="Google Shape;74;p14">
+            <a:extLst>
+              <a:ext uri="{FF2B5EF4-FFF2-40B4-BE49-F238E27FC236}">
+                <a16:creationId xmlns:a16="http://schemas.microsoft.com/office/drawing/2014/main" id="{93930104-FEC1-FBD9-0A5D-995A0FC3B850}"/>
+              </a:ext>
+            </a:extLst>
+          </p:cNvPr>
+          <p:cNvSpPr txBox="1"/>
+          <p:nvPr/>
+        </p:nvSpPr>
+        <p:spPr>
+          <a:xfrm>
+            <a:off x="843871" y="6960688"/>
+            <a:ext cx="1052883" cy="368528"/>
+          </a:xfrm>
+          <a:prstGeom prst="rect">
+            <a:avLst/>
+          </a:prstGeom>
+          <a:noFill/>
+          <a:ln>
+            <a:noFill/>
+          </a:ln>
+        </p:spPr>
+        <p:txBody>
+          <a:bodyPr spcFirstLastPara="1" wrap="square" lIns="75802" tIns="75802" rIns="75802" bIns="75802" anchor="t" anchorCtr="0">
+            <a:spAutoFit/>
+          </a:bodyPr>
+          <a:lstStyle/>
+          <a:p>
+            <a:pPr algn="r"/>
+            <a:r>
+              <a:rPr lang="de" b="1" dirty="0">
+                <a:solidFill>
+                  <a:schemeClr val="dk2"/>
+                </a:solidFill>
+                <a:latin typeface="Roboto"/>
+                <a:ea typeface="Roboto"/>
+                <a:cs typeface="Roboto"/>
+                <a:sym typeface="Roboto"/>
+              </a:rPr>
+              <a:t>Eingabe 2</a:t>
+            </a:r>
+            <a:endParaRPr b="1" dirty="0">
+              <a:solidFill>
+                <a:schemeClr val="dk2"/>
+              </a:solidFill>
+              <a:latin typeface="Roboto"/>
+              <a:ea typeface="Roboto"/>
+              <a:cs typeface="Roboto"/>
+              <a:sym typeface="Roboto"/>
+            </a:endParaRPr>
+          </a:p>
+        </p:txBody>
+      </p:sp>
+      <p:cxnSp>
+        <p:nvCxnSpPr>
+          <p:cNvPr id="38" name="Google Shape;75;p14">
+            <a:extLst>
+              <a:ext uri="{FF2B5EF4-FFF2-40B4-BE49-F238E27FC236}">
+                <a16:creationId xmlns:a16="http://schemas.microsoft.com/office/drawing/2014/main" id="{D0A7883C-5DFA-634D-5122-F95EBD54E920}"/>
+              </a:ext>
+            </a:extLst>
+          </p:cNvPr>
+          <p:cNvCxnSpPr>
+            <a:cxnSpLocks/>
+          </p:cNvCxnSpPr>
+          <p:nvPr/>
+        </p:nvCxnSpPr>
+        <p:spPr>
+          <a:xfrm>
+            <a:off x="1935480" y="8820570"/>
+            <a:ext cx="401733" cy="0"/>
+          </a:xfrm>
+          <a:prstGeom prst="straightConnector1">
+            <a:avLst/>
+          </a:prstGeom>
+          <a:noFill/>
+          <a:ln w="38100" cap="flat" cmpd="sng">
+            <a:solidFill>
+              <a:schemeClr val="dk2"/>
+            </a:solidFill>
+            <a:prstDash val="solid"/>
+            <a:round/>
+            <a:headEnd type="none" w="med" len="med"/>
+            <a:tailEnd type="triangle" w="med" len="med"/>
+          </a:ln>
+        </p:spPr>
+      </p:cxnSp>
+      <p:sp>
+        <p:nvSpPr>
+          <p:cNvPr id="39" name="Google Shape;76;p14">
+            <a:extLst>
+              <a:ext uri="{FF2B5EF4-FFF2-40B4-BE49-F238E27FC236}">
+                <a16:creationId xmlns:a16="http://schemas.microsoft.com/office/drawing/2014/main" id="{CBC20FF2-FFD2-8531-7D77-0C6503E4D2FA}"/>
+              </a:ext>
+            </a:extLst>
+          </p:cNvPr>
+          <p:cNvSpPr txBox="1"/>
+          <p:nvPr/>
+        </p:nvSpPr>
+        <p:spPr>
+          <a:xfrm>
+            <a:off x="843870" y="8636306"/>
+            <a:ext cx="1052883" cy="368528"/>
+          </a:xfrm>
+          <a:prstGeom prst="rect">
+            <a:avLst/>
+          </a:prstGeom>
+          <a:noFill/>
+          <a:ln>
+            <a:noFill/>
+          </a:ln>
+        </p:spPr>
+        <p:txBody>
+          <a:bodyPr spcFirstLastPara="1" wrap="square" lIns="75802" tIns="75802" rIns="75802" bIns="75802" anchor="t" anchorCtr="0">
+            <a:spAutoFit/>
+          </a:bodyPr>
+          <a:lstStyle/>
+          <a:p>
+            <a:pPr algn="r"/>
+            <a:r>
+              <a:rPr lang="de" b="1" dirty="0">
+                <a:solidFill>
+                  <a:schemeClr val="dk2"/>
+                </a:solidFill>
+                <a:latin typeface="Roboto"/>
+                <a:ea typeface="Roboto"/>
+                <a:cs typeface="Roboto"/>
+                <a:sym typeface="Roboto"/>
+              </a:rPr>
+              <a:t>Eingabe 3</a:t>
+            </a:r>
+            <a:endParaRPr b="1" dirty="0">
+              <a:solidFill>
+                <a:schemeClr val="dk2"/>
+              </a:solidFill>
+              <a:latin typeface="Roboto"/>
+              <a:ea typeface="Roboto"/>
+              <a:cs typeface="Roboto"/>
+              <a:sym typeface="Roboto"/>
+            </a:endParaRPr>
+          </a:p>
+        </p:txBody>
+      </p:sp>
+      <p:cxnSp>
+        <p:nvCxnSpPr>
+          <p:cNvPr id="40" name="Google Shape;77;p14">
+            <a:extLst>
+              <a:ext uri="{FF2B5EF4-FFF2-40B4-BE49-F238E27FC236}">
+                <a16:creationId xmlns:a16="http://schemas.microsoft.com/office/drawing/2014/main" id="{C2FD7F6A-EC43-866E-160B-700EF1E9855F}"/>
+              </a:ext>
+            </a:extLst>
+          </p:cNvPr>
+          <p:cNvCxnSpPr>
+            <a:cxnSpLocks/>
+          </p:cNvCxnSpPr>
+          <p:nvPr/>
+        </p:nvCxnSpPr>
+        <p:spPr>
+          <a:xfrm>
+            <a:off x="1935479" y="9677232"/>
+            <a:ext cx="401486" cy="7445"/>
+          </a:xfrm>
+          <a:prstGeom prst="straightConnector1">
+            <a:avLst/>
+          </a:prstGeom>
+          <a:noFill/>
+          <a:ln w="38100" cap="flat" cmpd="sng">
+            <a:solidFill>
+              <a:schemeClr val="dk2"/>
+            </a:solidFill>
+            <a:prstDash val="solid"/>
+            <a:round/>
+            <a:headEnd type="none" w="med" len="med"/>
+            <a:tailEnd type="triangle" w="med" len="med"/>
+          </a:ln>
+        </p:spPr>
+      </p:cxnSp>
+      <p:sp>
+        <p:nvSpPr>
+          <p:cNvPr id="41" name="Google Shape;78;p14">
+            <a:extLst>
+              <a:ext uri="{FF2B5EF4-FFF2-40B4-BE49-F238E27FC236}">
+                <a16:creationId xmlns:a16="http://schemas.microsoft.com/office/drawing/2014/main" id="{A153129F-A075-C6CA-BE78-D22A06B90C51}"/>
+              </a:ext>
+            </a:extLst>
+          </p:cNvPr>
+          <p:cNvSpPr txBox="1"/>
+          <p:nvPr/>
+        </p:nvSpPr>
+        <p:spPr>
+          <a:xfrm>
+            <a:off x="843870" y="9492968"/>
+            <a:ext cx="1052883" cy="368528"/>
+          </a:xfrm>
+          <a:prstGeom prst="rect">
+            <a:avLst/>
+          </a:prstGeom>
+          <a:noFill/>
+          <a:ln>
+            <a:noFill/>
+          </a:ln>
+        </p:spPr>
+        <p:txBody>
+          <a:bodyPr spcFirstLastPara="1" wrap="square" lIns="75802" tIns="75802" rIns="75802" bIns="75802" anchor="t" anchorCtr="0">
+            <a:spAutoFit/>
+          </a:bodyPr>
+          <a:lstStyle/>
+          <a:p>
+            <a:pPr algn="r"/>
+            <a:r>
+              <a:rPr lang="de" b="1" dirty="0">
+                <a:solidFill>
+                  <a:schemeClr val="dk2"/>
+                </a:solidFill>
+                <a:latin typeface="Roboto"/>
+                <a:ea typeface="Roboto"/>
+                <a:cs typeface="Roboto"/>
+                <a:sym typeface="Roboto"/>
+              </a:rPr>
+              <a:t>Eingabe 4</a:t>
+            </a:r>
+            <a:endParaRPr b="1" dirty="0">
+              <a:solidFill>
+                <a:schemeClr val="dk2"/>
+              </a:solidFill>
+              <a:latin typeface="Roboto"/>
+              <a:ea typeface="Roboto"/>
+              <a:cs typeface="Roboto"/>
+              <a:sym typeface="Roboto"/>
+            </a:endParaRPr>
+          </a:p>
+        </p:txBody>
+      </p:sp>
+      <p:sp>
+        <p:nvSpPr>
+          <p:cNvPr id="42" name="Google Shape;80;p14">
+            <a:extLst>
+              <a:ext uri="{FF2B5EF4-FFF2-40B4-BE49-F238E27FC236}">
+                <a16:creationId xmlns:a16="http://schemas.microsoft.com/office/drawing/2014/main" id="{067D9E4A-7A98-C6A3-AB61-4AB3E80ECE23}"/>
+              </a:ext>
+            </a:extLst>
+          </p:cNvPr>
+          <p:cNvSpPr txBox="1"/>
+          <p:nvPr/>
+        </p:nvSpPr>
+        <p:spPr>
+          <a:xfrm>
+            <a:off x="5590953" y="7809986"/>
+            <a:ext cx="1052883" cy="368528"/>
+          </a:xfrm>
+          <a:prstGeom prst="rect">
+            <a:avLst/>
+          </a:prstGeom>
+          <a:noFill/>
+          <a:ln>
+            <a:noFill/>
+          </a:ln>
+        </p:spPr>
+        <p:txBody>
+          <a:bodyPr spcFirstLastPara="1" wrap="square" lIns="75802" tIns="75802" rIns="75802" bIns="75802" anchor="t" anchorCtr="0">
+            <a:spAutoFit/>
+          </a:bodyPr>
+          <a:lstStyle/>
+          <a:p>
+            <a:r>
+              <a:rPr lang="de" b="1" dirty="0">
+                <a:solidFill>
+                  <a:srgbClr val="595959"/>
+                </a:solidFill>
+                <a:latin typeface="Roboto"/>
+                <a:ea typeface="Roboto"/>
+                <a:cs typeface="Roboto"/>
+                <a:sym typeface="Roboto"/>
+              </a:rPr>
+              <a:t>Ausgabe</a:t>
+            </a:r>
+            <a:endParaRPr b="1" dirty="0">
+              <a:solidFill>
+                <a:srgbClr val="595959"/>
+              </a:solidFill>
+              <a:latin typeface="Roboto"/>
+              <a:ea typeface="Roboto"/>
+              <a:cs typeface="Roboto"/>
+              <a:sym typeface="Roboto"/>
+            </a:endParaRPr>
+          </a:p>
+        </p:txBody>
+      </p:sp>
+      <p:cxnSp>
+        <p:nvCxnSpPr>
+          <p:cNvPr id="43" name="Google Shape;71;p14">
+            <a:extLst>
+              <a:ext uri="{FF2B5EF4-FFF2-40B4-BE49-F238E27FC236}">
+                <a16:creationId xmlns:a16="http://schemas.microsoft.com/office/drawing/2014/main" id="{3E5A9831-52E6-4F11-71D5-FFAA1E25640D}"/>
+              </a:ext>
+            </a:extLst>
+          </p:cNvPr>
+          <p:cNvCxnSpPr>
+            <a:cxnSpLocks/>
+          </p:cNvCxnSpPr>
+          <p:nvPr/>
+        </p:nvCxnSpPr>
+        <p:spPr>
+          <a:xfrm>
+            <a:off x="5189220" y="7994250"/>
+            <a:ext cx="401733" cy="0"/>
+          </a:xfrm>
+          <a:prstGeom prst="straightConnector1">
+            <a:avLst/>
+          </a:prstGeom>
+          <a:noFill/>
+          <a:ln w="38100" cap="flat" cmpd="sng">
+            <a:solidFill>
+              <a:srgbClr val="595959"/>
+            </a:solidFill>
+            <a:prstDash val="solid"/>
+            <a:round/>
+            <a:headEnd type="none" w="med" len="med"/>
+            <a:tailEnd type="triangle" w="med" len="med"/>
+          </a:ln>
+        </p:spPr>
+      </p:cxnSp>
+      <p:sp>
+        <p:nvSpPr>
+          <p:cNvPr id="44" name="Google Shape;72;p14">
+            <a:extLst>
+              <a:ext uri="{FF2B5EF4-FFF2-40B4-BE49-F238E27FC236}">
+                <a16:creationId xmlns:a16="http://schemas.microsoft.com/office/drawing/2014/main" id="{E53C69FF-375B-3DF0-2BB5-369D0D91424F}"/>
+              </a:ext>
+            </a:extLst>
+          </p:cNvPr>
+          <p:cNvSpPr txBox="1"/>
+          <p:nvPr/>
+        </p:nvSpPr>
+        <p:spPr>
+          <a:xfrm>
+            <a:off x="2081153" y="5471293"/>
+            <a:ext cx="3336390" cy="399306"/>
+          </a:xfrm>
+          <a:prstGeom prst="rect">
+            <a:avLst/>
+          </a:prstGeom>
+          <a:noFill/>
+          <a:ln>
+            <a:noFill/>
+          </a:ln>
+        </p:spPr>
+        <p:txBody>
+          <a:bodyPr spcFirstLastPara="1" wrap="square" lIns="75802" tIns="75802" rIns="75802" bIns="75802" anchor="t" anchorCtr="0">
+            <a:spAutoFit/>
+          </a:bodyPr>
+          <a:lstStyle/>
+          <a:p>
+            <a:pPr algn="ctr"/>
+            <a:r>
+              <a:rPr lang="de" sz="1600" b="1" dirty="0">
+                <a:solidFill>
+                  <a:schemeClr val="accent4">
+                    <a:lumMod val="75000"/>
+                  </a:schemeClr>
+                </a:solidFill>
+                <a:latin typeface="Roboto"/>
+                <a:ea typeface="Roboto"/>
+                <a:cs typeface="Roboto"/>
+                <a:sym typeface="Roboto"/>
+              </a:rPr>
+              <a:t>Masked Language Modelling</a:t>
+            </a:r>
+            <a:endParaRPr sz="1600" b="1" dirty="0">
+              <a:solidFill>
+                <a:schemeClr val="accent4">
+                  <a:lumMod val="75000"/>
+                </a:schemeClr>
+              </a:solidFill>
+              <a:latin typeface="Roboto"/>
+              <a:ea typeface="Roboto"/>
+              <a:cs typeface="Roboto"/>
+              <a:sym typeface="Roboto"/>
+            </a:endParaRPr>
+          </a:p>
+        </p:txBody>
+      </p:sp>
+      <p:sp>
+        <p:nvSpPr>
+          <p:cNvPr id="46" name="Google Shape;58;p13">
+            <a:extLst>
+              <a:ext uri="{FF2B5EF4-FFF2-40B4-BE49-F238E27FC236}">
+                <a16:creationId xmlns:a16="http://schemas.microsoft.com/office/drawing/2014/main" id="{A1B452AB-0D94-63DD-D575-0F325A25DEB0}"/>
+              </a:ext>
+            </a:extLst>
+          </p:cNvPr>
+          <p:cNvSpPr/>
+          <p:nvPr/>
+        </p:nvSpPr>
+        <p:spPr>
+          <a:xfrm>
+            <a:off x="2492351" y="6040427"/>
+            <a:ext cx="2513992" cy="535939"/>
+          </a:xfrm>
+          <a:prstGeom prst="rect">
+            <a:avLst/>
+          </a:prstGeom>
+          <a:noFill/>
+          <a:ln w="6350" cap="flat" cmpd="sng">
+            <a:solidFill>
+              <a:schemeClr val="lt2"/>
+            </a:solidFill>
+            <a:prstDash val="solid"/>
+            <a:round/>
+            <a:headEnd type="none" w="sm" len="sm"/>
+            <a:tailEnd type="none" w="sm" len="sm"/>
+          </a:ln>
+        </p:spPr>
+        <p:txBody>
+          <a:bodyPr spcFirstLastPara="1" wrap="square" lIns="75802" tIns="75802" rIns="75802" bIns="75802" anchor="ctr" anchorCtr="0">
+            <a:noAutofit/>
+          </a:bodyPr>
+          <a:lstStyle/>
+          <a:p>
+            <a:pPr algn="ctr"/>
+            <a:endParaRPr sz="991"/>
+          </a:p>
+        </p:txBody>
+      </p:sp>
+      <p:cxnSp>
+        <p:nvCxnSpPr>
+          <p:cNvPr id="47" name="Google Shape;59;p13">
+            <a:extLst>
+              <a:ext uri="{FF2B5EF4-FFF2-40B4-BE49-F238E27FC236}">
+                <a16:creationId xmlns:a16="http://schemas.microsoft.com/office/drawing/2014/main" id="{44F29C73-1958-5E2C-60EC-4F7DADD6FBA0}"/>
+              </a:ext>
+            </a:extLst>
+          </p:cNvPr>
+          <p:cNvCxnSpPr>
+            <a:cxnSpLocks/>
+          </p:cNvCxnSpPr>
+          <p:nvPr/>
+        </p:nvCxnSpPr>
+        <p:spPr>
+          <a:xfrm rot="10800000">
+            <a:off x="-3" y="5385816"/>
+            <a:ext cx="7559675" cy="0"/>
+          </a:xfrm>
+          <a:prstGeom prst="straightConnector1">
+            <a:avLst/>
+          </a:prstGeom>
+          <a:noFill/>
+          <a:ln w="12700" cap="flat" cmpd="sng">
+            <a:solidFill>
+              <a:schemeClr val="lt2"/>
+            </a:solidFill>
+            <a:prstDash val="solid"/>
+            <a:round/>
+            <a:headEnd type="none" w="med" len="med"/>
+            <a:tailEnd type="none" w="med" len="med"/>
+          </a:ln>
+        </p:spPr>
+      </p:cxnSp>
+      <p:cxnSp>
+        <p:nvCxnSpPr>
+          <p:cNvPr id="48" name="Google Shape;60;p13">
+            <a:extLst>
+              <a:ext uri="{FF2B5EF4-FFF2-40B4-BE49-F238E27FC236}">
+                <a16:creationId xmlns:a16="http://schemas.microsoft.com/office/drawing/2014/main" id="{20AE4A7B-34A9-7EAC-4E20-D218A041898D}"/>
+              </a:ext>
+            </a:extLst>
+          </p:cNvPr>
+          <p:cNvCxnSpPr>
+            <a:cxnSpLocks/>
+          </p:cNvCxnSpPr>
+          <p:nvPr/>
+        </p:nvCxnSpPr>
+        <p:spPr>
+          <a:xfrm rot="10800000">
+            <a:off x="-4" y="10252907"/>
+            <a:ext cx="7559675" cy="0"/>
+          </a:xfrm>
+          <a:prstGeom prst="straightConnector1">
+            <a:avLst/>
+          </a:prstGeom>
+          <a:noFill/>
+          <a:ln w="12700" cap="flat" cmpd="sng">
+            <a:solidFill>
+              <a:schemeClr val="lt2"/>
+            </a:solidFill>
+            <a:prstDash val="solid"/>
+            <a:round/>
+            <a:headEnd type="none" w="med" len="med"/>
+            <a:tailEnd type="none" w="med" len="med"/>
+          </a:ln>
+        </p:spPr>
+      </p:cxnSp>
+      <p:cxnSp>
+        <p:nvCxnSpPr>
+          <p:cNvPr id="49" name="Google Shape;59;p13">
+            <a:extLst>
+              <a:ext uri="{FF2B5EF4-FFF2-40B4-BE49-F238E27FC236}">
+                <a16:creationId xmlns:a16="http://schemas.microsoft.com/office/drawing/2014/main" id="{733CDFDC-76BC-819A-1CC6-918736497CEC}"/>
+              </a:ext>
+            </a:extLst>
+          </p:cNvPr>
+          <p:cNvCxnSpPr>
+            <a:cxnSpLocks/>
+          </p:cNvCxnSpPr>
+          <p:nvPr/>
+        </p:nvCxnSpPr>
+        <p:spPr>
+          <a:xfrm>
+            <a:off x="6840000" y="4873695"/>
+            <a:ext cx="0" cy="5733946"/>
+          </a:xfrm>
+          <a:prstGeom prst="straightConnector1">
+            <a:avLst/>
+          </a:prstGeom>
+          <a:noFill/>
+          <a:ln w="12700" cap="flat" cmpd="sng">
+            <a:solidFill>
+              <a:schemeClr val="lt2"/>
+            </a:solidFill>
+            <a:prstDash val="solid"/>
+            <a:round/>
+            <a:headEnd type="none" w="med" len="med"/>
+            <a:tailEnd type="none" w="med" len="med"/>
+          </a:ln>
+        </p:spPr>
+      </p:cxnSp>
+      <p:cxnSp>
+        <p:nvCxnSpPr>
+          <p:cNvPr id="50" name="Google Shape;59;p13">
+            <a:extLst>
+              <a:ext uri="{FF2B5EF4-FFF2-40B4-BE49-F238E27FC236}">
+                <a16:creationId xmlns:a16="http://schemas.microsoft.com/office/drawing/2014/main" id="{5535DE88-14F5-6E65-92ED-BB4800A8D9BC}"/>
+              </a:ext>
+            </a:extLst>
+          </p:cNvPr>
+          <p:cNvCxnSpPr>
+            <a:cxnSpLocks/>
+          </p:cNvCxnSpPr>
+          <p:nvPr/>
+        </p:nvCxnSpPr>
+        <p:spPr>
+          <a:xfrm>
+            <a:off x="720000" y="4873695"/>
+            <a:ext cx="0" cy="5733946"/>
+          </a:xfrm>
+          <a:prstGeom prst="straightConnector1">
+            <a:avLst/>
+          </a:prstGeom>
+          <a:noFill/>
+          <a:ln w="12700" cap="flat" cmpd="sng">
+            <a:solidFill>
+              <a:schemeClr val="lt2"/>
+            </a:solidFill>
+            <a:prstDash val="solid"/>
+            <a:round/>
+            <a:headEnd type="none" w="med" len="med"/>
+            <a:tailEnd type="none" w="med" len="med"/>
+          </a:ln>
+        </p:spPr>
+      </p:cxnSp>
+      <p:sp>
+        <p:nvSpPr>
+          <p:cNvPr id="51" name="Google Shape;58;p13">
+            <a:extLst>
+              <a:ext uri="{FF2B5EF4-FFF2-40B4-BE49-F238E27FC236}">
+                <a16:creationId xmlns:a16="http://schemas.microsoft.com/office/drawing/2014/main" id="{7EACF739-8D45-3371-F15D-0C3C0BB683D3}"/>
+              </a:ext>
+            </a:extLst>
+          </p:cNvPr>
+          <p:cNvSpPr/>
+          <p:nvPr/>
+        </p:nvSpPr>
+        <p:spPr>
+          <a:xfrm>
+            <a:off x="2492351" y="6875484"/>
+            <a:ext cx="2513992" cy="535939"/>
+          </a:xfrm>
+          <a:prstGeom prst="rect">
+            <a:avLst/>
+          </a:prstGeom>
+          <a:noFill/>
+          <a:ln w="6350" cap="flat" cmpd="sng">
+            <a:solidFill>
+              <a:schemeClr val="lt2"/>
+            </a:solidFill>
+            <a:prstDash val="solid"/>
+            <a:round/>
+            <a:headEnd type="none" w="sm" len="sm"/>
+            <a:tailEnd type="none" w="sm" len="sm"/>
+          </a:ln>
+        </p:spPr>
+        <p:txBody>
+          <a:bodyPr spcFirstLastPara="1" wrap="square" lIns="75802" tIns="75802" rIns="75802" bIns="75802" anchor="ctr" anchorCtr="0">
+            <a:noAutofit/>
+          </a:bodyPr>
+          <a:lstStyle/>
+          <a:p>
+            <a:pPr algn="ctr"/>
+            <a:endParaRPr sz="991"/>
+          </a:p>
+        </p:txBody>
+      </p:sp>
+      <p:sp>
+        <p:nvSpPr>
+          <p:cNvPr id="52" name="Google Shape;58;p13">
+            <a:extLst>
+              <a:ext uri="{FF2B5EF4-FFF2-40B4-BE49-F238E27FC236}">
+                <a16:creationId xmlns:a16="http://schemas.microsoft.com/office/drawing/2014/main" id="{5B2B014E-15CF-1518-4BAD-D829C6D1C393}"/>
+              </a:ext>
+            </a:extLst>
+          </p:cNvPr>
+          <p:cNvSpPr/>
+          <p:nvPr/>
+        </p:nvSpPr>
+        <p:spPr>
+          <a:xfrm>
+            <a:off x="2492351" y="8571352"/>
+            <a:ext cx="2513992" cy="535939"/>
+          </a:xfrm>
+          <a:prstGeom prst="rect">
+            <a:avLst/>
+          </a:prstGeom>
+          <a:noFill/>
+          <a:ln w="6350" cap="flat" cmpd="sng">
+            <a:solidFill>
+              <a:schemeClr val="lt2"/>
+            </a:solidFill>
+            <a:prstDash val="solid"/>
+            <a:round/>
+            <a:headEnd type="none" w="sm" len="sm"/>
+            <a:tailEnd type="none" w="sm" len="sm"/>
+          </a:ln>
+        </p:spPr>
+        <p:txBody>
+          <a:bodyPr spcFirstLastPara="1" wrap="square" lIns="75802" tIns="75802" rIns="75802" bIns="75802" anchor="ctr" anchorCtr="0">
+            <a:noAutofit/>
+          </a:bodyPr>
+          <a:lstStyle/>
+          <a:p>
+            <a:pPr algn="ctr"/>
+            <a:endParaRPr sz="991"/>
+          </a:p>
+        </p:txBody>
+      </p:sp>
+      <p:sp>
+        <p:nvSpPr>
+          <p:cNvPr id="53" name="Google Shape;58;p13">
+            <a:extLst>
+              <a:ext uri="{FF2B5EF4-FFF2-40B4-BE49-F238E27FC236}">
+                <a16:creationId xmlns:a16="http://schemas.microsoft.com/office/drawing/2014/main" id="{6F7BA1A0-B6C4-B4D0-1C65-2FD4AF3E30B4}"/>
+              </a:ext>
+            </a:extLst>
+          </p:cNvPr>
+          <p:cNvSpPr/>
+          <p:nvPr/>
+        </p:nvSpPr>
+        <p:spPr>
+          <a:xfrm>
+            <a:off x="2492351" y="9404322"/>
+            <a:ext cx="2513992" cy="535939"/>
+          </a:xfrm>
+          <a:prstGeom prst="rect">
+            <a:avLst/>
+          </a:prstGeom>
+          <a:noFill/>
+          <a:ln w="6350" cap="flat" cmpd="sng">
+            <a:solidFill>
+              <a:schemeClr val="lt2"/>
+            </a:solidFill>
+            <a:prstDash val="solid"/>
+            <a:round/>
+            <a:headEnd type="none" w="sm" len="sm"/>
+            <a:tailEnd type="none" w="sm" len="sm"/>
+          </a:ln>
+        </p:spPr>
+        <p:txBody>
+          <a:bodyPr spcFirstLastPara="1" wrap="square" lIns="75802" tIns="75802" rIns="75802" bIns="75802" anchor="ctr" anchorCtr="0">
+            <a:noAutofit/>
+          </a:bodyPr>
+          <a:lstStyle/>
+          <a:p>
+            <a:pPr algn="ctr"/>
+            <a:endParaRPr sz="991"/>
+          </a:p>
+        </p:txBody>
+      </p:sp>
+      <p:sp>
+        <p:nvSpPr>
+          <p:cNvPr id="54" name="Google Shape;58;p13">
+            <a:extLst>
+              <a:ext uri="{FF2B5EF4-FFF2-40B4-BE49-F238E27FC236}">
+                <a16:creationId xmlns:a16="http://schemas.microsoft.com/office/drawing/2014/main" id="{7D12CA34-D007-6B0B-0759-01EC4AC9D0DC}"/>
+              </a:ext>
+            </a:extLst>
+          </p:cNvPr>
+          <p:cNvSpPr/>
+          <p:nvPr/>
+        </p:nvSpPr>
+        <p:spPr>
+          <a:xfrm>
+            <a:off x="2492351" y="7720922"/>
+            <a:ext cx="2513992" cy="535939"/>
+          </a:xfrm>
+          <a:prstGeom prst="rect">
+            <a:avLst/>
+          </a:prstGeom>
+          <a:noFill/>
+          <a:ln w="6350" cap="flat" cmpd="sng">
+            <a:solidFill>
+              <a:schemeClr val="lt2"/>
+            </a:solidFill>
+            <a:prstDash val="solid"/>
+            <a:round/>
+            <a:headEnd type="none" w="sm" len="sm"/>
+            <a:tailEnd type="none" w="sm" len="sm"/>
+          </a:ln>
+        </p:spPr>
+        <p:txBody>
+          <a:bodyPr spcFirstLastPara="1" wrap="square" lIns="75802" tIns="75802" rIns="75802" bIns="75802" anchor="ctr" anchorCtr="0">
+            <a:noAutofit/>
+          </a:bodyPr>
+          <a:lstStyle/>
+          <a:p>
+            <a:pPr algn="ctr"/>
+            <a:endParaRPr sz="991"/>
+          </a:p>
+        </p:txBody>
+      </p:sp>
     </p:spTree>
   </p:cSld>
   <p:clrMapOvr>

</xml_diff>

<commit_message>
Fix box sizes when using xelatex, add description to cutting template pptx
</commit_message>
<xml_diff>
--- a/Wissenschaftskommunikations Artikel/sliding-window/sliding_window_cutting_template.pptx
+++ b/Wissenschaftskommunikations Artikel/sliding-window/sliding_window_cutting_template.pptx
@@ -6054,7 +6054,7 @@
         <p:spPr>
           <a:xfrm>
             <a:off x="1404824" y="1623786"/>
-            <a:ext cx="4750018" cy="307777"/>
+            <a:ext cx="4750018" cy="523220"/>
           </a:xfrm>
           <a:prstGeom prst="rect">
             <a:avLst/>
@@ -6067,6 +6067,7 @@
           </a:bodyPr>
           <a:lstStyle/>
           <a:p>
+            <a:pPr algn="ctr"/>
             <a:r>
               <a:rPr lang="de-DE" dirty="0">
                 <a:solidFill>
@@ -6074,6 +6075,57 @@
                 </a:solidFill>
               </a:rPr>
               <a:t>Nur geeignet für beidseitigen Druck an der längeren Seite</a:t>
+            </a:r>
+          </a:p>
+          <a:p>
+            <a:pPr algn="ctr"/>
+            <a:r>
+              <a:rPr lang="de-DE" dirty="0">
+                <a:solidFill>
+                  <a:srgbClr val="FF0000"/>
+                </a:solidFill>
+              </a:rPr>
+              <a:t>(Das ist die Rückseite)</a:t>
+            </a:r>
+          </a:p>
+        </p:txBody>
+      </p:sp>
+      <p:sp>
+        <p:nvSpPr>
+          <p:cNvPr id="7" name="Textfeld 6">
+            <a:extLst>
+              <a:ext uri="{FF2B5EF4-FFF2-40B4-BE49-F238E27FC236}">
+                <a16:creationId xmlns:a16="http://schemas.microsoft.com/office/drawing/2014/main" id="{FA4553F8-C6E3-9C14-2986-897FA85F50D4}"/>
+              </a:ext>
+            </a:extLst>
+          </p:cNvPr>
+          <p:cNvSpPr txBox="1"/>
+          <p:nvPr/>
+        </p:nvSpPr>
+        <p:spPr>
+          <a:xfrm rot="16200000">
+            <a:off x="-508659" y="6320397"/>
+            <a:ext cx="1757212" cy="261610"/>
+          </a:xfrm>
+          <a:prstGeom prst="rect">
+            <a:avLst/>
+          </a:prstGeom>
+          <a:noFill/>
+        </p:spPr>
+        <p:txBody>
+          <a:bodyPr wrap="none" rtlCol="0">
+            <a:spAutoFit/>
+          </a:bodyPr>
+          <a:lstStyle/>
+          <a:p>
+            <a:pPr algn="ctr"/>
+            <a:r>
+              <a:rPr lang="de-DE" sz="1100" dirty="0">
+                <a:solidFill>
+                  <a:schemeClr val="tx1"/>
+                </a:solidFill>
+              </a:rPr>
+              <a:t>Graue Linie = Schnittlinie</a:t>
             </a:r>
           </a:p>
         </p:txBody>
@@ -6819,7 +6871,7 @@
         <p:spPr>
           <a:xfrm>
             <a:off x="1404824" y="1623786"/>
-            <a:ext cx="4750018" cy="307777"/>
+            <a:ext cx="4750018" cy="523220"/>
           </a:xfrm>
           <a:prstGeom prst="rect">
             <a:avLst/>
@@ -6832,6 +6884,7 @@
           </a:bodyPr>
           <a:lstStyle/>
           <a:p>
+            <a:pPr algn="ctr"/>
             <a:r>
               <a:rPr lang="de-DE" dirty="0">
                 <a:solidFill>
@@ -6839,6 +6892,17 @@
                 </a:solidFill>
               </a:rPr>
               <a:t>Nur geeignet für beidseitigen Druck an der längeren Seite</a:t>
+            </a:r>
+          </a:p>
+          <a:p>
+            <a:pPr algn="ctr"/>
+            <a:r>
+              <a:rPr lang="de-DE" dirty="0">
+                <a:solidFill>
+                  <a:srgbClr val="FF0000"/>
+                </a:solidFill>
+              </a:rPr>
+              <a:t>(Das ist die Vorderseite)</a:t>
             </a:r>
           </a:p>
         </p:txBody>
@@ -8920,6 +8984,86 @@
           <a:p>
             <a:pPr algn="ctr"/>
             <a:endParaRPr sz="991"/>
+          </a:p>
+        </p:txBody>
+      </p:sp>
+      <p:sp>
+        <p:nvSpPr>
+          <p:cNvPr id="45" name="Textfeld 44">
+            <a:extLst>
+              <a:ext uri="{FF2B5EF4-FFF2-40B4-BE49-F238E27FC236}">
+                <a16:creationId xmlns:a16="http://schemas.microsoft.com/office/drawing/2014/main" id="{DB3FE5E4-F4D2-EDFB-E750-488A925694BE}"/>
+              </a:ext>
+            </a:extLst>
+          </p:cNvPr>
+          <p:cNvSpPr txBox="1"/>
+          <p:nvPr/>
+        </p:nvSpPr>
+        <p:spPr>
+          <a:xfrm rot="16200000">
+            <a:off x="-508659" y="2764070"/>
+            <a:ext cx="1757212" cy="261610"/>
+          </a:xfrm>
+          <a:prstGeom prst="rect">
+            <a:avLst/>
+          </a:prstGeom>
+          <a:noFill/>
+        </p:spPr>
+        <p:txBody>
+          <a:bodyPr wrap="none" rtlCol="0">
+            <a:spAutoFit/>
+          </a:bodyPr>
+          <a:lstStyle/>
+          <a:p>
+            <a:pPr algn="ctr"/>
+            <a:r>
+              <a:rPr lang="de-DE" sz="1100" dirty="0">
+                <a:solidFill>
+                  <a:schemeClr val="tx1"/>
+                </a:solidFill>
+              </a:rPr>
+              <a:t>Graue Linie = Schnittlinie</a:t>
+            </a:r>
+          </a:p>
+        </p:txBody>
+      </p:sp>
+      <p:sp>
+        <p:nvSpPr>
+          <p:cNvPr id="55" name="Textfeld 54">
+            <a:extLst>
+              <a:ext uri="{FF2B5EF4-FFF2-40B4-BE49-F238E27FC236}">
+                <a16:creationId xmlns:a16="http://schemas.microsoft.com/office/drawing/2014/main" id="{00FB2D93-107B-3CDE-D2CF-8C1045B7B025}"/>
+              </a:ext>
+            </a:extLst>
+          </p:cNvPr>
+          <p:cNvSpPr txBox="1"/>
+          <p:nvPr/>
+        </p:nvSpPr>
+        <p:spPr>
+          <a:xfrm>
+            <a:off x="2721662" y="1306866"/>
+            <a:ext cx="2055370" cy="261610"/>
+          </a:xfrm>
+          <a:prstGeom prst="rect">
+            <a:avLst/>
+          </a:prstGeom>
+          <a:noFill/>
+        </p:spPr>
+        <p:txBody>
+          <a:bodyPr wrap="none" rtlCol="0">
+            <a:spAutoFit/>
+          </a:bodyPr>
+          <a:lstStyle/>
+          <a:p>
+            <a:pPr algn="ctr"/>
+            <a:r>
+              <a:rPr lang="de-DE" sz="1100" dirty="0">
+                <a:solidFill>
+                  <a:schemeClr val="bg1"/>
+                </a:solidFill>
+              </a:rPr>
+              <a:t>Weißer Rahmen = Schnittlinie</a:t>
+            </a:r>
           </a:p>
         </p:txBody>
       </p:sp>

</xml_diff>

<commit_message>
Add missing documentation for sliding window, move instructions to correct location, provide ready-to-print files
</commit_message>
<xml_diff>
--- a/Wissenschaftskommunikations Artikel/sliding-window/sliding_window_cutting_template.pptx
+++ b/Wissenschaftskommunikations Artikel/sliding-window/sliding_window_cutting_template.pptx
@@ -6778,7 +6778,7 @@
                 <a:cs typeface="Roboto"/>
                 <a:sym typeface="Roboto"/>
               </a:rPr>
-              <a:t>Masked Language Modelling</a:t>
+              <a:t>Masked Language Model</a:t>
             </a:r>
             <a:endParaRPr sz="1600" b="1" dirty="0">
               <a:solidFill>
@@ -7560,7 +7560,7 @@
                 <a:cs typeface="Roboto"/>
                 <a:sym typeface="Roboto"/>
               </a:rPr>
-              <a:t>Masked Language Modelling</a:t>
+              <a:t>Masked Language Model</a:t>
             </a:r>
             <a:endParaRPr sz="1600" b="1" dirty="0">
               <a:solidFill>
@@ -8625,7 +8625,7 @@
                 <a:cs typeface="Roboto"/>
                 <a:sym typeface="Roboto"/>
               </a:rPr>
-              <a:t>Masked Language Modelling</a:t>
+              <a:t>Masked Language Model</a:t>
             </a:r>
             <a:endParaRPr sz="1600" b="1" dirty="0">
               <a:solidFill>

</xml_diff>